<commit_message>
This is the end
</commit_message>
<xml_diff>
--- a/Последняя версия презентации.pptx
+++ b/Последняя версия презентации.pptx
@@ -5,7 +5,7 @@
     <p:sldMasterId id="2147483659" r:id="rId1"/>
   </p:sldMasterIdLst>
   <p:notesMasterIdLst>
-    <p:notesMasterId r:id="rId24"/>
+    <p:notesMasterId r:id="rId25"/>
   </p:notesMasterIdLst>
   <p:sldIdLst>
     <p:sldId id="256" r:id="rId2"/>
@@ -29,24 +29,25 @@
     <p:sldId id="273" r:id="rId20"/>
     <p:sldId id="277" r:id="rId21"/>
     <p:sldId id="281" r:id="rId22"/>
-    <p:sldId id="275" r:id="rId23"/>
+    <p:sldId id="282" r:id="rId23"/>
+    <p:sldId id="275" r:id="rId24"/>
   </p:sldIdLst>
   <p:sldSz cx="9144000" cy="5143500" type="screen16x9"/>
   <p:notesSz cx="6858000" cy="9144000"/>
   <p:embeddedFontLst>
     <p:embeddedFont>
       <p:font typeface="Raleway" charset="0"/>
-      <p:regular r:id="rId25"/>
-      <p:bold r:id="rId26"/>
-      <p:italic r:id="rId27"/>
-      <p:boldItalic r:id="rId28"/>
+      <p:regular r:id="rId26"/>
+      <p:bold r:id="rId27"/>
+      <p:italic r:id="rId28"/>
+      <p:boldItalic r:id="rId29"/>
     </p:embeddedFont>
     <p:embeddedFont>
       <p:font typeface="Lato" charset="0"/>
-      <p:regular r:id="rId29"/>
-      <p:bold r:id="rId30"/>
-      <p:italic r:id="rId31"/>
-      <p:boldItalic r:id="rId32"/>
+      <p:regular r:id="rId30"/>
+      <p:bold r:id="rId31"/>
+      <p:italic r:id="rId32"/>
+      <p:boldItalic r:id="rId33"/>
     </p:embeddedFont>
   </p:embeddedFontLst>
   <p:defaultTextStyle>
@@ -8827,7 +8828,7 @@
               <a:buNone/>
             </a:pPr>
             <a:r>
-              <a:rPr lang="ru" sz="4300">
+              <a:rPr lang="ru" sz="4300" dirty="0">
                 <a:solidFill>
                   <a:srgbClr val="464646"/>
                 </a:solidFill>
@@ -8955,6 +8956,13 @@
   <p:clrMapOvr>
     <a:masterClrMapping/>
   </p:clrMapOvr>
+  <p:timing>
+    <p:tnLst>
+      <p:par>
+        <p:cTn id="1" dur="indefinite" restart="never" nodeType="tmRoot"/>
+      </p:par>
+    </p:tnLst>
+  </p:timing>
 </p:sld>
 </file>
 
@@ -9057,7 +9065,7 @@
                 <a:cs typeface="Arial"/>
                 <a:sym typeface="Arial"/>
               </a:rPr>
-              <a:t>Программный </a:t>
+              <a:t> Программный </a:t>
             </a:r>
             <a:r>
               <a:rPr lang="ru" sz="1400" dirty="0">
@@ -9081,7 +9089,7 @@
                 <a:cs typeface="Arial"/>
                 <a:sym typeface="Arial"/>
               </a:rPr>
-              <a:t>браузере</a:t>
+              <a:t>браузере.</a:t>
             </a:r>
             <a:endParaRPr sz="1400">
               <a:solidFill>
@@ -9109,7 +9117,7 @@
                 <a:cs typeface="Arial"/>
                 <a:sym typeface="Arial"/>
               </a:rPr>
-              <a:t>Функционал   </a:t>
+              <a:t> Функционал   </a:t>
             </a:r>
             <a:r>
               <a:rPr lang="ru" sz="1400" dirty="0">
@@ -9121,7 +9129,19 @@
                 <a:cs typeface="Arial"/>
                 <a:sym typeface="Arial"/>
               </a:rPr>
-              <a:t>должен использовать существующую   структуру БД в части хранения договоров</a:t>
+              <a:t>должен использовать существующую   структуру БД в части хранения </a:t>
+            </a:r>
+            <a:r>
+              <a:rPr lang="ru" sz="1400" dirty="0" smtClean="0">
+                <a:solidFill>
+                  <a:srgbClr val="000000"/>
+                </a:solidFill>
+                <a:latin typeface="Arial"/>
+                <a:ea typeface="Arial"/>
+                <a:cs typeface="Arial"/>
+                <a:sym typeface="Arial"/>
+              </a:rPr>
+              <a:t>договоров.</a:t>
             </a:r>
             <a:endParaRPr sz="1400">
               <a:solidFill>
@@ -9175,7 +9195,7 @@
               </a:spcBef>
             </a:pPr>
             <a:r>
-              <a:rPr lang="ru" sz="1400" dirty="0">
+              <a:rPr lang="ru" sz="1400" dirty="0" smtClean="0">
                 <a:solidFill>
                   <a:srgbClr val="000000"/>
                 </a:solidFill>
@@ -9184,7 +9204,43 @@
                 <a:cs typeface="Arial"/>
                 <a:sym typeface="Arial"/>
               </a:rPr>
-              <a:t>Использовать REST-сообщения, SQL-запросы для взаимодействия программных модулей</a:t>
+              <a:t> Использовать </a:t>
+            </a:r>
+            <a:r>
+              <a:rPr lang="ru" sz="1400" dirty="0">
+                <a:solidFill>
+                  <a:srgbClr val="000000"/>
+                </a:solidFill>
+                <a:latin typeface="Arial"/>
+                <a:ea typeface="Arial"/>
+                <a:cs typeface="Arial"/>
+                <a:sym typeface="Arial"/>
+              </a:rPr>
+              <a:t>REST-сообщения, SQL-запросы для взаимодействия программных </a:t>
+            </a:r>
+            <a:r>
+              <a:rPr lang="ru" sz="1400" dirty="0" smtClean="0">
+                <a:solidFill>
+                  <a:srgbClr val="000000"/>
+                </a:solidFill>
+                <a:latin typeface="Arial"/>
+                <a:ea typeface="Arial"/>
+                <a:cs typeface="Arial"/>
+                <a:sym typeface="Arial"/>
+              </a:rPr>
+              <a:t>модулей</a:t>
+            </a:r>
+            <a:r>
+              <a:rPr lang="ru" sz="1400" dirty="0">
+                <a:solidFill>
+                  <a:srgbClr val="000000"/>
+                </a:solidFill>
+                <a:latin typeface="Arial"/>
+                <a:ea typeface="Arial"/>
+                <a:cs typeface="Arial"/>
+                <a:sym typeface="Arial"/>
+              </a:rPr>
+              <a:t>.</a:t>
             </a:r>
             <a:endParaRPr sz="1400">
               <a:solidFill>
@@ -9195,18 +9251,6 @@
               <a:cs typeface="Arial"/>
               <a:sym typeface="Arial"/>
             </a:endParaRPr>
-          </a:p>
-          <a:p>
-            <a:pPr marL="0" lvl="0" indent="0" algn="l" rtl="0">
-              <a:spcBef>
-                <a:spcPts val="0"/>
-              </a:spcBef>
-              <a:spcAft>
-                <a:spcPts val="1600"/>
-              </a:spcAft>
-              <a:buNone/>
-            </a:pPr>
-            <a:endParaRPr/>
           </a:p>
         </p:txBody>
       </p:sp>
@@ -9257,18 +9301,6 @@
               <a:defRPr/>
             </a:pPr>
             <a:r>
-              <a:rPr lang="ru-RU" dirty="0" smtClean="0">
-                <a:solidFill>
-                  <a:schemeClr val="accent1"/>
-                </a:solidFill>
-                <a:latin typeface="Lato"/>
-                <a:ea typeface="Lato"/>
-                <a:cs typeface="Lato"/>
-                <a:sym typeface="Lato"/>
-              </a:rPr>
-              <a:t>9</a:t>
-            </a:r>
-            <a:r>
               <a:rPr kumimoji="0" lang="ru-RU" sz="1400" b="0" i="0" u="none" strike="noStrike" kern="0" cap="none" spc="0" normalizeH="0" noProof="0" dirty="0" smtClean="0">
                 <a:ln>
                   <a:noFill/>
@@ -9284,7 +9316,25 @@
                 <a:cs typeface="Lato"/>
                 <a:sym typeface="Lato"/>
               </a:rPr>
-              <a:t>/20</a:t>
+              <a:t>10</a:t>
+            </a:r>
+            <a:r>
+              <a:rPr kumimoji="0" lang="ru-RU" sz="1400" b="0" i="0" u="none" strike="noStrike" kern="0" cap="none" spc="0" normalizeH="0" noProof="0" dirty="0" smtClean="0">
+                <a:ln>
+                  <a:noFill/>
+                </a:ln>
+                <a:solidFill>
+                  <a:schemeClr val="accent1"/>
+                </a:solidFill>
+                <a:effectLst/>
+                <a:uLnTx/>
+                <a:uFillTx/>
+                <a:latin typeface="Lato"/>
+                <a:ea typeface="Lato"/>
+                <a:cs typeface="Lato"/>
+                <a:sym typeface="Lato"/>
+              </a:rPr>
+              <a:t>/23</a:t>
             </a:r>
             <a:endParaRPr kumimoji="0" lang="ru-RU" sz="1400" b="0" i="0" u="none" strike="noStrike" kern="0" cap="none" spc="0" normalizeH="0" baseline="0" noProof="0" dirty="0">
               <a:ln>
@@ -9309,6 +9359,13 @@
   <p:clrMapOvr>
     <a:masterClrMapping/>
   </p:clrMapOvr>
+  <p:timing>
+    <p:tnLst>
+      <p:par>
+        <p:cTn id="1" dur="indefinite" restart="never" nodeType="tmRoot"/>
+      </p:par>
+    </p:tnLst>
+  </p:timing>
 </p:sld>
 </file>
 
@@ -9377,47 +9434,75 @@
             </a:pPr>
             <a:r>
               <a:rPr lang="ru-RU" dirty="0" smtClean="0"/>
-              <a:t>	Использовать </a:t>
-            </a:r>
-            <a:r>
-              <a:rPr lang="ru-RU" dirty="0" smtClean="0"/>
-              <a:t>при импорте договоров «Черный ящик»</a:t>
+              <a:t>	</a:t>
+            </a:r>
+            <a:r>
+              <a:rPr lang="ru-RU" dirty="0" smtClean="0">
+                <a:solidFill>
+                  <a:schemeClr val="bg2"/>
+                </a:solidFill>
+                <a:latin typeface="+mn-lt"/>
+              </a:rPr>
+              <a:t>Использовать при импорте договоров «Черный ящик»</a:t>
             </a:r>
           </a:p>
           <a:p>
             <a:pPr>
               <a:buNone/>
             </a:pPr>
-            <a:endParaRPr lang="ru-RU" dirty="0" smtClean="0"/>
+            <a:endParaRPr lang="ru-RU" dirty="0" smtClean="0">
+              <a:solidFill>
+                <a:schemeClr val="bg2"/>
+              </a:solidFill>
+              <a:latin typeface="+mn-lt"/>
+            </a:endParaRPr>
           </a:p>
           <a:p>
             <a:pPr>
               <a:buNone/>
             </a:pPr>
             <a:r>
-              <a:rPr lang="ru-RU" dirty="0" smtClean="0"/>
-              <a:t>	Черный </a:t>
-            </a:r>
-            <a:r>
-              <a:rPr lang="ru-RU" dirty="0" smtClean="0"/>
-              <a:t>ящик представляет собой </a:t>
-            </a:r>
-            <a:r>
-              <a:rPr lang="ru-RU" dirty="0" err="1" smtClean="0"/>
+              <a:rPr lang="ru-RU" dirty="0" smtClean="0">
+                <a:solidFill>
+                  <a:schemeClr val="bg2"/>
+                </a:solidFill>
+                <a:latin typeface="+mn-lt"/>
+              </a:rPr>
+              <a:t>	Черный ящик представляет собой </a:t>
+            </a:r>
+            <a:r>
+              <a:rPr lang="ru-RU" dirty="0" err="1" smtClean="0">
+                <a:solidFill>
+                  <a:schemeClr val="bg2"/>
+                </a:solidFill>
+                <a:latin typeface="+mn-lt"/>
+              </a:rPr>
               <a:t>программу-парсер</a:t>
             </a:r>
             <a:r>
-              <a:rPr lang="ru-RU" dirty="0" smtClean="0"/>
-              <a:t>, которая работает на </a:t>
-            </a:r>
-            <a:r>
-              <a:rPr lang="ru-RU" dirty="0" smtClean="0"/>
-              <a:t>клиентском сервере </a:t>
-            </a:r>
-            <a:r>
-              <a:rPr lang="ru-RU" dirty="0" smtClean="0"/>
-              <a:t>и предоставляет возможность разбивать и импортировать в таблицы БД договора, содержащиеся в реестре</a:t>
-            </a:r>
+              <a:rPr lang="ru-RU" dirty="0" smtClean="0">
+                <a:solidFill>
+                  <a:schemeClr val="bg2"/>
+                </a:solidFill>
+                <a:latin typeface="+mn-lt"/>
+              </a:rPr>
+              <a:t>, которая работает на клиентском сервере и предоставляет возможность разбивать и импортировать в таблицы БД договора, содержащиеся в </a:t>
+            </a:r>
+            <a:r>
+              <a:rPr lang="ru-RU" dirty="0" smtClean="0">
+                <a:solidFill>
+                  <a:schemeClr val="bg2"/>
+                </a:solidFill>
+                <a:latin typeface="+mn-lt"/>
+              </a:rPr>
+              <a:t>реестре.</a:t>
+            </a:r>
+            <a:endParaRPr lang="ru-RU" dirty="0" smtClean="0">
+              <a:solidFill>
+                <a:schemeClr val="bg2"/>
+              </a:solidFill>
+              <a:latin typeface="+mn-lt"/>
+            </a:endParaRPr>
           </a:p>
           <a:p>
             <a:pPr>
@@ -9489,7 +9574,7 @@
                 <a:cs typeface="Lato"/>
                 <a:sym typeface="Lato"/>
               </a:rPr>
-              <a:t>10</a:t>
+              <a:t>11</a:t>
             </a:r>
             <a:r>
               <a:rPr kumimoji="0" lang="ru-RU" sz="1400" b="0" i="0" u="none" strike="noStrike" kern="0" cap="none" spc="0" normalizeH="0" noProof="0" dirty="0" smtClean="0">
@@ -9507,7 +9592,7 @@
                 <a:cs typeface="Lato"/>
                 <a:sym typeface="Lato"/>
               </a:rPr>
-              <a:t>/20</a:t>
+              <a:t>/23</a:t>
             </a:r>
             <a:endParaRPr kumimoji="0" lang="ru-RU" sz="1400" b="0" i="0" u="none" strike="noStrike" kern="0" cap="none" spc="0" normalizeH="0" baseline="0" noProof="0" dirty="0">
               <a:ln>
@@ -9532,6 +9617,13 @@
   <p:clrMapOvr>
     <a:masterClrMapping/>
   </p:clrMapOvr>
+  <p:timing>
+    <p:tnLst>
+      <p:par>
+        <p:cTn id="1" dur="indefinite" restart="never" nodeType="tmRoot"/>
+      </p:par>
+    </p:tnLst>
+  </p:timing>
 </p:sld>
 </file>
 
@@ -9731,7 +9823,7 @@
                 <a:cs typeface="Lato"/>
                 <a:sym typeface="Lato"/>
               </a:rPr>
-              <a:t>11</a:t>
+              <a:t>12</a:t>
             </a:r>
             <a:r>
               <a:rPr kumimoji="0" lang="ru-RU" sz="1400" b="0" i="0" u="none" strike="noStrike" kern="0" cap="none" spc="0" normalizeH="0" noProof="0" dirty="0" smtClean="0">
@@ -9749,7 +9841,7 @@
                 <a:cs typeface="Lato"/>
                 <a:sym typeface="Lato"/>
               </a:rPr>
-              <a:t>/20</a:t>
+              <a:t>/23</a:t>
             </a:r>
             <a:endParaRPr kumimoji="0" lang="ru-RU" sz="1400" b="0" i="0" u="none" strike="noStrike" kern="0" cap="none" spc="0" normalizeH="0" baseline="0" noProof="0" dirty="0">
               <a:ln>
@@ -9774,6 +9866,13 @@
   <p:clrMapOvr>
     <a:masterClrMapping/>
   </p:clrMapOvr>
+  <p:timing>
+    <p:tnLst>
+      <p:par>
+        <p:cTn id="1" dur="indefinite" restart="never" nodeType="tmRoot"/>
+      </p:par>
+    </p:tnLst>
+  </p:timing>
 </p:sld>
 </file>
 
@@ -9926,7 +10025,7 @@
                 <a:cs typeface="Lato"/>
                 <a:sym typeface="Lato"/>
               </a:rPr>
-              <a:t>12</a:t>
+              <a:t>13</a:t>
             </a:r>
             <a:r>
               <a:rPr kumimoji="0" lang="ru-RU" sz="1400" b="0" i="0" u="none" strike="noStrike" kern="0" cap="none" spc="0" normalizeH="0" noProof="0" dirty="0" smtClean="0">
@@ -9944,7 +10043,7 @@
                 <a:cs typeface="Lato"/>
                 <a:sym typeface="Lato"/>
               </a:rPr>
-              <a:t>/20</a:t>
+              <a:t>/23</a:t>
             </a:r>
             <a:endParaRPr kumimoji="0" lang="ru-RU" sz="1400" b="0" i="0" u="none" strike="noStrike" kern="0" cap="none" spc="0" normalizeH="0" baseline="0" noProof="0" dirty="0">
               <a:ln>
@@ -9969,6 +10068,13 @@
   <p:clrMapOvr>
     <a:masterClrMapping/>
   </p:clrMapOvr>
+  <p:timing>
+    <p:tnLst>
+      <p:par>
+        <p:cTn id="1" dur="indefinite" restart="never" nodeType="tmRoot"/>
+      </p:par>
+    </p:tnLst>
+  </p:timing>
 </p:sld>
 </file>
 
@@ -10121,7 +10227,7 @@
                 <a:cs typeface="Lato"/>
                 <a:sym typeface="Lato"/>
               </a:rPr>
-              <a:t>13</a:t>
+              <a:t>14</a:t>
             </a:r>
             <a:r>
               <a:rPr kumimoji="0" lang="ru-RU" sz="1400" b="0" i="0" u="none" strike="noStrike" kern="0" cap="none" spc="0" normalizeH="0" noProof="0" dirty="0" smtClean="0">
@@ -10139,7 +10245,7 @@
                 <a:cs typeface="Lato"/>
                 <a:sym typeface="Lato"/>
               </a:rPr>
-              <a:t>/20</a:t>
+              <a:t>/23</a:t>
             </a:r>
             <a:endParaRPr kumimoji="0" lang="ru-RU" sz="1400" b="0" i="0" u="none" strike="noStrike" kern="0" cap="none" spc="0" normalizeH="0" baseline="0" noProof="0" dirty="0">
               <a:ln>
@@ -10164,6 +10270,13 @@
   <p:clrMapOvr>
     <a:masterClrMapping/>
   </p:clrMapOvr>
+  <p:timing>
+    <p:tnLst>
+      <p:par>
+        <p:cTn id="1" dur="indefinite" restart="never" nodeType="tmRoot"/>
+      </p:par>
+    </p:tnLst>
+  </p:timing>
 </p:sld>
 </file>
 
@@ -10320,7 +10433,7 @@
                 <a:cs typeface="Lato"/>
                 <a:sym typeface="Lato"/>
               </a:rPr>
-              <a:t>14</a:t>
+              <a:t>15</a:t>
             </a:r>
             <a:r>
               <a:rPr kumimoji="0" lang="ru-RU" sz="1400" b="0" i="0" u="none" strike="noStrike" kern="0" cap="none" spc="0" normalizeH="0" noProof="0" dirty="0" smtClean="0">
@@ -10338,7 +10451,7 @@
                 <a:cs typeface="Lato"/>
                 <a:sym typeface="Lato"/>
               </a:rPr>
-              <a:t>/20</a:t>
+              <a:t>/23</a:t>
             </a:r>
             <a:endParaRPr kumimoji="0" lang="ru-RU" sz="1400" b="0" i="0" u="none" strike="noStrike" kern="0" cap="none" spc="0" normalizeH="0" baseline="0" noProof="0" dirty="0">
               <a:ln>
@@ -10363,6 +10476,13 @@
   <p:clrMapOvr>
     <a:masterClrMapping/>
   </p:clrMapOvr>
+  <p:timing>
+    <p:tnLst>
+      <p:par>
+        <p:cTn id="1" dur="indefinite" restart="never" nodeType="tmRoot"/>
+      </p:par>
+    </p:tnLst>
+  </p:timing>
 </p:sld>
 </file>
 
@@ -10519,7 +10639,7 @@
                 <a:cs typeface="Lato"/>
                 <a:sym typeface="Lato"/>
               </a:rPr>
-              <a:t>15</a:t>
+              <a:t>16</a:t>
             </a:r>
             <a:r>
               <a:rPr kumimoji="0" lang="ru-RU" sz="1400" b="0" i="0" u="none" strike="noStrike" kern="0" cap="none" spc="0" normalizeH="0" noProof="0" dirty="0" smtClean="0">
@@ -10537,7 +10657,7 @@
                 <a:cs typeface="Lato"/>
                 <a:sym typeface="Lato"/>
               </a:rPr>
-              <a:t>/20</a:t>
+              <a:t>/23</a:t>
             </a:r>
             <a:endParaRPr kumimoji="0" lang="ru-RU" sz="1400" b="0" i="0" u="none" strike="noStrike" kern="0" cap="none" spc="0" normalizeH="0" baseline="0" noProof="0" dirty="0">
               <a:ln>
@@ -10562,6 +10682,13 @@
   <p:clrMapOvr>
     <a:masterClrMapping/>
   </p:clrMapOvr>
+  <p:timing>
+    <p:tnLst>
+      <p:par>
+        <p:cTn id="1" dur="indefinite" restart="never" nodeType="tmRoot"/>
+      </p:par>
+    </p:tnLst>
+  </p:timing>
 </p:sld>
 </file>
 
@@ -10718,7 +10845,7 @@
                 <a:cs typeface="Lato"/>
                 <a:sym typeface="Lato"/>
               </a:rPr>
-              <a:t>16</a:t>
+              <a:t>17</a:t>
             </a:r>
             <a:r>
               <a:rPr kumimoji="0" lang="ru-RU" sz="1400" b="0" i="0" u="none" strike="noStrike" kern="0" cap="none" spc="0" normalizeH="0" noProof="0" dirty="0" smtClean="0">
@@ -10736,7 +10863,7 @@
                 <a:cs typeface="Lato"/>
                 <a:sym typeface="Lato"/>
               </a:rPr>
-              <a:t>/20</a:t>
+              <a:t>/23</a:t>
             </a:r>
             <a:endParaRPr kumimoji="0" lang="ru-RU" sz="1400" b="0" i="0" u="none" strike="noStrike" kern="0" cap="none" spc="0" normalizeH="0" baseline="0" noProof="0" dirty="0">
               <a:ln>
@@ -10761,6 +10888,13 @@
   <p:clrMapOvr>
     <a:masterClrMapping/>
   </p:clrMapOvr>
+  <p:timing>
+    <p:tnLst>
+      <p:par>
+        <p:cTn id="1" dur="indefinite" restart="never" nodeType="tmRoot"/>
+      </p:par>
+    </p:tnLst>
+  </p:timing>
 </p:sld>
 </file>
 
@@ -10861,6 +10995,25 @@
               <a:rPr lang="en-US" dirty="0" smtClean="0"/>
               <a:t>Java</a:t>
             </a:r>
+          </a:p>
+          <a:p>
+            <a:pPr marL="0" indent="0">
+              <a:spcAft>
+                <a:spcPts val="1600"/>
+              </a:spcAft>
+            </a:pPr>
+            <a:r>
+              <a:rPr lang="ru-RU" dirty="0" err="1" smtClean="0"/>
+              <a:t>Фрейворк</a:t>
+            </a:r>
+            <a:r>
+              <a:rPr lang="ru-RU" dirty="0" smtClean="0"/>
+              <a:t> </a:t>
+            </a:r>
+            <a:r>
+              <a:rPr lang="en-US" dirty="0" err="1" smtClean="0"/>
+              <a:t>RESTEasy</a:t>
+            </a:r>
             <a:endParaRPr lang="en-US" dirty="0" smtClean="0"/>
           </a:p>
           <a:p>
@@ -10870,16 +11023,12 @@
               </a:spcAft>
             </a:pPr>
             <a:r>
-              <a:rPr lang="ru-RU" dirty="0" err="1" smtClean="0"/>
-              <a:t>Фрейворк</a:t>
-            </a:r>
-            <a:r>
               <a:rPr lang="ru-RU" dirty="0" smtClean="0"/>
-              <a:t> </a:t>
+              <a:t>Сервер приложений </a:t>
             </a:r>
             <a:r>
               <a:rPr lang="en-US" dirty="0" err="1" smtClean="0"/>
-              <a:t>RESTEasy</a:t>
+              <a:t>WildFly</a:t>
             </a:r>
             <a:endParaRPr lang="en-US" dirty="0" smtClean="0"/>
           </a:p>
@@ -10891,11 +11040,11 @@
             </a:pPr>
             <a:r>
               <a:rPr lang="ru-RU" dirty="0" smtClean="0"/>
-              <a:t>Сервер приложений </a:t>
+              <a:t>Брокер сообщений </a:t>
             </a:r>
             <a:r>
               <a:rPr lang="en-US" dirty="0" err="1" smtClean="0"/>
-              <a:t>WildFly</a:t>
+              <a:t>RabbitMQ</a:t>
             </a:r>
             <a:endParaRPr lang="en-US" dirty="0" smtClean="0"/>
           </a:p>
@@ -10907,13 +11056,12 @@
             </a:pPr>
             <a:r>
               <a:rPr lang="ru-RU" dirty="0" smtClean="0"/>
-              <a:t>Брокер сообщений </a:t>
-            </a:r>
-            <a:r>
-              <a:rPr lang="en-US" dirty="0" err="1" smtClean="0"/>
-              <a:t>RabbitMQ</a:t>
-            </a:r>
-            <a:endParaRPr lang="en-US" dirty="0" smtClean="0"/>
+              <a:t>Фреймворк </a:t>
+            </a:r>
+            <a:r>
+              <a:rPr lang="en-US" dirty="0" smtClean="0"/>
+              <a:t>Angular</a:t>
+            </a:r>
           </a:p>
           <a:p>
             <a:pPr marL="0" indent="0">
@@ -10922,25 +11070,6 @@
               </a:spcAft>
             </a:pPr>
             <a:r>
-              <a:rPr lang="ru-RU" dirty="0" smtClean="0"/>
-              <a:t>Ф</a:t>
-            </a:r>
-            <a:r>
-              <a:rPr lang="ru-RU" dirty="0" smtClean="0"/>
-              <a:t>реймворк </a:t>
-            </a:r>
-            <a:r>
-              <a:rPr lang="en-US" dirty="0" smtClean="0"/>
-              <a:t>Angular</a:t>
-            </a:r>
-          </a:p>
-          <a:p>
-            <a:pPr marL="0" indent="0">
-              <a:spcAft>
-                <a:spcPts val="1600"/>
-              </a:spcAft>
-            </a:pPr>
-            <a:r>
               <a:rPr lang="en-US" dirty="0" smtClean="0"/>
               <a:t>ORM </a:t>
             </a:r>
@@ -10950,11 +11079,7 @@
             </a:r>
             <a:r>
               <a:rPr lang="en-US" dirty="0" smtClean="0"/>
-              <a:t>Apache </a:t>
-            </a:r>
-            <a:r>
-              <a:rPr lang="en-US" dirty="0" smtClean="0"/>
-              <a:t>Cayenne</a:t>
+              <a:t>Apache Cayenne</a:t>
             </a:r>
             <a:endParaRPr/>
           </a:p>
@@ -11190,7 +11315,7 @@
                 <a:cs typeface="Lato"/>
                 <a:sym typeface="Lato"/>
               </a:rPr>
-              <a:t>17</a:t>
+              <a:t>18</a:t>
             </a:r>
             <a:r>
               <a:rPr kumimoji="0" lang="ru-RU" sz="1400" b="0" i="0" u="none" strike="noStrike" kern="0" cap="none" spc="0" normalizeH="0" noProof="0" dirty="0" smtClean="0">
@@ -11208,7 +11333,7 @@
                 <a:cs typeface="Lato"/>
                 <a:sym typeface="Lato"/>
               </a:rPr>
-              <a:t>/20</a:t>
+              <a:t>/23</a:t>
             </a:r>
             <a:endParaRPr kumimoji="0" lang="ru-RU" sz="1400" b="0" i="0" u="none" strike="noStrike" kern="0" cap="none" spc="0" normalizeH="0" baseline="0" noProof="0" dirty="0">
               <a:ln>
@@ -11233,6 +11358,13 @@
   <p:clrMapOvr>
     <a:masterClrMapping/>
   </p:clrMapOvr>
+  <p:timing>
+    <p:tnLst>
+      <p:par>
+        <p:cTn id="1" dur="indefinite" restart="never" nodeType="tmRoot"/>
+      </p:par>
+    </p:tnLst>
+  </p:timing>
 </p:sld>
 </file>
 
@@ -11365,7 +11497,7 @@
                 <a:cs typeface="Lato"/>
                 <a:sym typeface="Lato"/>
               </a:rPr>
-              <a:t>18</a:t>
+              <a:t>19</a:t>
             </a:r>
             <a:r>
               <a:rPr kumimoji="0" lang="ru-RU" sz="1400" b="0" i="0" u="none" strike="noStrike" kern="0" cap="none" spc="0" normalizeH="0" noProof="0" dirty="0" smtClean="0">
@@ -11383,7 +11515,7 @@
                 <a:cs typeface="Lato"/>
                 <a:sym typeface="Lato"/>
               </a:rPr>
-              <a:t>/20</a:t>
+              <a:t>/23</a:t>
             </a:r>
             <a:endParaRPr kumimoji="0" lang="ru-RU" sz="1400" b="0" i="0" u="none" strike="noStrike" kern="0" cap="none" spc="0" normalizeH="0" baseline="0" noProof="0" dirty="0">
               <a:ln>
@@ -11403,62 +11535,448 @@
           </a:p>
         </p:txBody>
       </p:sp>
-      <p:sp>
-        <p:nvSpPr>
-          <p:cNvPr id="7" name="TextBox 6"/>
-          <p:cNvSpPr txBox="1"/>
+      <p:graphicFrame>
+        <p:nvGraphicFramePr>
+          <p:cNvPr id="6" name="Таблица 5"/>
+          <p:cNvGraphicFramePr>
+            <a:graphicFrameLocks noGrp="1"/>
+          </p:cNvGraphicFramePr>
           <p:nvPr/>
-        </p:nvSpPr>
-        <p:spPr>
-          <a:xfrm>
-            <a:off x="256374" y="2298818"/>
-            <a:ext cx="7508787" cy="738664"/>
-          </a:xfrm>
-          <a:prstGeom prst="rect">
-            <a:avLst/>
-          </a:prstGeom>
-          <a:noFill/>
-        </p:spPr>
-        <p:txBody>
-          <a:bodyPr wrap="none" rtlCol="0">
-            <a:spAutoFit/>
-          </a:bodyPr>
-          <a:lstStyle/>
-          <a:p>
-            <a:r>
-              <a:rPr lang="ru-RU" dirty="0" smtClean="0"/>
-              <a:t>Программа успешно прошла тестирование. </a:t>
-            </a:r>
-            <a:br>
-              <a:rPr lang="ru-RU" dirty="0" smtClean="0"/>
-            </a:br>
-            <a:r>
-              <a:rPr lang="ru-RU" dirty="0" smtClean="0"/>
-              <a:t>По результатам нагрузочного </a:t>
-            </a:r>
-            <a:r>
-              <a:rPr lang="ru-RU" dirty="0" err="1" smtClean="0"/>
-              <a:t>тестирования,максимальная</a:t>
-            </a:r>
-            <a:r>
-              <a:rPr lang="ru-RU" dirty="0" smtClean="0"/>
-              <a:t> производительность </a:t>
-            </a:r>
-          </a:p>
-          <a:p>
-            <a:r>
-              <a:rPr lang="ru-RU" dirty="0" smtClean="0"/>
-              <a:t>системы достигается при обработке или удалении около 300 тысяч документов в час.</a:t>
-            </a:r>
-            <a:endParaRPr lang="ru-RU" dirty="0"/>
-          </a:p>
-        </p:txBody>
-      </p:sp>
+        </p:nvGraphicFramePr>
+        <p:xfrm>
+          <a:off x="626694" y="1983740"/>
+          <a:ext cx="7158525" cy="2595880"/>
+        </p:xfrm>
+        <a:graphic>
+          <a:graphicData uri="http://schemas.openxmlformats.org/drawingml/2006/table">
+            <a:tbl>
+              <a:tblPr firstRow="1" bandRow="1">
+                <a:tableStyleId>{3EBB83A6-FA0F-476A-9E62-656254E54296}</a:tableStyleId>
+              </a:tblPr>
+              <a:tblGrid>
+                <a:gridCol w="1192751"/>
+                <a:gridCol w="1192751"/>
+                <a:gridCol w="1192751"/>
+                <a:gridCol w="1192751"/>
+                <a:gridCol w="2387521"/>
+              </a:tblGrid>
+              <a:tr h="370840">
+                <a:tc>
+                  <a:txBody>
+                    <a:bodyPr/>
+                    <a:lstStyle/>
+                    <a:p>
+                      <a:r>
+                        <a:rPr lang="ru-RU" sz="900" dirty="0" smtClean="0"/>
+                        <a:t>Вид тестирования</a:t>
+                      </a:r>
+                      <a:endParaRPr lang="ru-RU" sz="900" dirty="0"/>
+                    </a:p>
+                  </a:txBody>
+                  <a:tcPr/>
+                </a:tc>
+                <a:tc>
+                  <a:txBody>
+                    <a:bodyPr/>
+                    <a:lstStyle/>
+                    <a:p>
+                      <a:r>
+                        <a:rPr lang="ru-RU" sz="900" dirty="0" smtClean="0"/>
+                        <a:t>Тест</a:t>
+                      </a:r>
+                      <a:endParaRPr lang="ru-RU" sz="900" dirty="0"/>
+                    </a:p>
+                  </a:txBody>
+                  <a:tcPr/>
+                </a:tc>
+                <a:tc>
+                  <a:txBody>
+                    <a:bodyPr/>
+                    <a:lstStyle/>
+                    <a:p>
+                      <a:r>
+                        <a:rPr lang="ru-RU" sz="900" dirty="0" smtClean="0"/>
+                        <a:t>Входные данные</a:t>
+                      </a:r>
+                      <a:endParaRPr lang="ru-RU" sz="900" dirty="0"/>
+                    </a:p>
+                  </a:txBody>
+                  <a:tcPr/>
+                </a:tc>
+                <a:tc>
+                  <a:txBody>
+                    <a:bodyPr/>
+                    <a:lstStyle/>
+                    <a:p>
+                      <a:r>
+                        <a:rPr lang="ru-RU" sz="900" dirty="0" smtClean="0"/>
+                        <a:t>Ожидаемый результат</a:t>
+                      </a:r>
+                      <a:endParaRPr lang="ru-RU" sz="900" dirty="0"/>
+                    </a:p>
+                  </a:txBody>
+                  <a:tcPr/>
+                </a:tc>
+                <a:tc>
+                  <a:txBody>
+                    <a:bodyPr/>
+                    <a:lstStyle/>
+                    <a:p>
+                      <a:r>
+                        <a:rPr lang="ru-RU" sz="900" dirty="0" smtClean="0"/>
+                        <a:t>Результат</a:t>
+                      </a:r>
+                      <a:endParaRPr lang="ru-RU" sz="900" dirty="0"/>
+                    </a:p>
+                  </a:txBody>
+                  <a:tcPr/>
+                </a:tc>
+              </a:tr>
+              <a:tr h="370840">
+                <a:tc>
+                  <a:txBody>
+                    <a:bodyPr/>
+                    <a:lstStyle/>
+                    <a:p>
+                      <a:r>
+                        <a:rPr lang="ru-RU" sz="800" dirty="0" smtClean="0"/>
+                        <a:t>Модульное</a:t>
+                      </a:r>
+                      <a:endParaRPr lang="ru-RU" sz="800" dirty="0"/>
+                    </a:p>
+                  </a:txBody>
+                  <a:tcPr/>
+                </a:tc>
+                <a:tc>
+                  <a:txBody>
+                    <a:bodyPr/>
+                    <a:lstStyle/>
+                    <a:p>
+                      <a:r>
+                        <a:rPr lang="ru-RU" sz="800" dirty="0" smtClean="0"/>
+                        <a:t>Метод обработки данных«</a:t>
+                      </a:r>
+                      <a:r>
+                        <a:rPr lang="en-US" sz="800" dirty="0" err="1" smtClean="0"/>
+                        <a:t>procesingDocumeent</a:t>
+                      </a:r>
+                      <a:r>
+                        <a:rPr lang="ru-RU" sz="800" dirty="0" smtClean="0"/>
+                        <a:t>»</a:t>
+                      </a:r>
+                      <a:endParaRPr lang="ru-RU" sz="800" dirty="0"/>
+                    </a:p>
+                  </a:txBody>
+                  <a:tcPr/>
+                </a:tc>
+                <a:tc>
+                  <a:txBody>
+                    <a:bodyPr/>
+                    <a:lstStyle/>
+                    <a:p>
+                      <a:r>
+                        <a:rPr lang="ru-RU" sz="800" dirty="0" smtClean="0"/>
+                        <a:t>Индекс</a:t>
+                      </a:r>
+                      <a:r>
+                        <a:rPr lang="ru-RU" sz="800" baseline="0" dirty="0" smtClean="0"/>
+                        <a:t> обработки договоров, набор </a:t>
+                      </a:r>
+                      <a:r>
+                        <a:rPr lang="ru-RU" sz="800" baseline="0" dirty="0" err="1" smtClean="0"/>
+                        <a:t>валидных</a:t>
+                      </a:r>
+                      <a:r>
+                        <a:rPr lang="ru-RU" sz="800" baseline="0" dirty="0" smtClean="0"/>
+                        <a:t> договоров</a:t>
+                      </a:r>
+                      <a:endParaRPr lang="ru-RU" sz="800" dirty="0"/>
+                    </a:p>
+                  </a:txBody>
+                  <a:tcPr/>
+                </a:tc>
+                <a:tc>
+                  <a:txBody>
+                    <a:bodyPr/>
+                    <a:lstStyle/>
+                    <a:p>
+                      <a:r>
+                        <a:rPr lang="ru-RU" sz="800" dirty="0" smtClean="0"/>
+                        <a:t>Успешная обработка, добавление договоров</a:t>
+                      </a:r>
+                      <a:r>
+                        <a:rPr lang="ru-RU" sz="800" baseline="0" dirty="0" smtClean="0"/>
+                        <a:t> в таблицу активных договоров</a:t>
+                      </a:r>
+                      <a:endParaRPr lang="ru-RU" sz="800" dirty="0"/>
+                    </a:p>
+                  </a:txBody>
+                  <a:tcPr/>
+                </a:tc>
+                <a:tc>
+                  <a:txBody>
+                    <a:bodyPr/>
+                    <a:lstStyle/>
+                    <a:p>
+                      <a:pPr marL="0" marR="0" indent="0" algn="l" defTabSz="914400" rtl="0" eaLnBrk="1" fontAlgn="auto" latinLnBrk="0" hangingPunct="1">
+                        <a:lnSpc>
+                          <a:spcPct val="100000"/>
+                        </a:lnSpc>
+                        <a:spcBef>
+                          <a:spcPts val="0"/>
+                        </a:spcBef>
+                        <a:spcAft>
+                          <a:spcPts val="0"/>
+                        </a:spcAft>
+                        <a:buClr>
+                          <a:srgbClr val="000000"/>
+                        </a:buClr>
+                        <a:buSzTx/>
+                        <a:buFont typeface="Arial"/>
+                        <a:buNone/>
+                        <a:tabLst/>
+                        <a:defRPr/>
+                      </a:pPr>
+                      <a:r>
+                        <a:rPr lang="ru-RU" sz="800" dirty="0" smtClean="0"/>
+                        <a:t>Успешная обработка, добавление договоров</a:t>
+                      </a:r>
+                      <a:r>
+                        <a:rPr lang="ru-RU" sz="800" baseline="0" dirty="0" smtClean="0"/>
+                        <a:t> в таблицу активных договоров</a:t>
+                      </a:r>
+                      <a:endParaRPr lang="ru-RU" sz="800" dirty="0" smtClean="0"/>
+                    </a:p>
+                    <a:p>
+                      <a:endParaRPr lang="ru-RU" sz="800" dirty="0"/>
+                    </a:p>
+                  </a:txBody>
+                  <a:tcPr/>
+                </a:tc>
+              </a:tr>
+              <a:tr h="370840">
+                <a:tc>
+                  <a:txBody>
+                    <a:bodyPr/>
+                    <a:lstStyle/>
+                    <a:p>
+                      <a:r>
+                        <a:rPr lang="ru-RU" sz="800" dirty="0" smtClean="0"/>
+                        <a:t>Интеграционное</a:t>
+                      </a:r>
+                      <a:endParaRPr lang="ru-RU" sz="800" dirty="0"/>
+                    </a:p>
+                  </a:txBody>
+                  <a:tcPr/>
+                </a:tc>
+                <a:tc>
+                  <a:txBody>
+                    <a:bodyPr/>
+                    <a:lstStyle/>
+                    <a:p>
+                      <a:r>
+                        <a:rPr lang="ru-RU" sz="800" dirty="0" smtClean="0"/>
+                        <a:t>Набор методов</a:t>
+                      </a:r>
+                      <a:r>
+                        <a:rPr lang="ru-RU" sz="800" baseline="0" dirty="0" smtClean="0"/>
+                        <a:t> сценария обработки реестра</a:t>
+                      </a:r>
+                      <a:endParaRPr lang="ru-RU" sz="800" dirty="0"/>
+                    </a:p>
+                  </a:txBody>
+                  <a:tcPr/>
+                </a:tc>
+                <a:tc>
+                  <a:txBody>
+                    <a:bodyPr/>
+                    <a:lstStyle/>
+                    <a:p>
+                      <a:r>
+                        <a:rPr lang="ru-RU" sz="800" dirty="0" smtClean="0"/>
+                        <a:t>Индекс реестра, который необходимо обработать. Реестр содержит ошибки</a:t>
+                      </a:r>
+                      <a:endParaRPr lang="ru-RU" sz="800" dirty="0"/>
+                    </a:p>
+                  </a:txBody>
+                  <a:tcPr/>
+                </a:tc>
+                <a:tc>
+                  <a:txBody>
+                    <a:bodyPr/>
+                    <a:lstStyle/>
+                    <a:p>
+                      <a:r>
+                        <a:rPr lang="ru-RU" sz="800" dirty="0" smtClean="0"/>
+                        <a:t>Добавление</a:t>
+                      </a:r>
+                      <a:r>
+                        <a:rPr lang="ru-RU" sz="800" baseline="0" dirty="0" smtClean="0"/>
+                        <a:t> обработанных договоров в таблицу активных договоров, сообщение о количестве необработанных</a:t>
+                      </a:r>
+                      <a:endParaRPr lang="ru-RU" sz="800" dirty="0"/>
+                    </a:p>
+                  </a:txBody>
+                  <a:tcPr/>
+                </a:tc>
+                <a:tc>
+                  <a:txBody>
+                    <a:bodyPr/>
+                    <a:lstStyle/>
+                    <a:p>
+                      <a:pPr marL="0" marR="0" indent="0" algn="l" defTabSz="914400" rtl="0" eaLnBrk="1" fontAlgn="auto" latinLnBrk="0" hangingPunct="1">
+                        <a:lnSpc>
+                          <a:spcPct val="100000"/>
+                        </a:lnSpc>
+                        <a:spcBef>
+                          <a:spcPts val="0"/>
+                        </a:spcBef>
+                        <a:spcAft>
+                          <a:spcPts val="0"/>
+                        </a:spcAft>
+                        <a:buClr>
+                          <a:srgbClr val="000000"/>
+                        </a:buClr>
+                        <a:buSzTx/>
+                        <a:buFont typeface="Arial"/>
+                        <a:buNone/>
+                        <a:tabLst/>
+                        <a:defRPr/>
+                      </a:pPr>
+                      <a:r>
+                        <a:rPr lang="ru-RU" sz="800" dirty="0" smtClean="0"/>
+                        <a:t>Добавление</a:t>
+                      </a:r>
+                      <a:r>
+                        <a:rPr lang="ru-RU" sz="800" baseline="0" dirty="0" smtClean="0"/>
+                        <a:t> обработанных договоров в таблицу активных договоров, сообщение о количестве необработанных</a:t>
+                      </a:r>
+                      <a:endParaRPr lang="ru-RU" sz="800" dirty="0" smtClean="0"/>
+                    </a:p>
+                    <a:p>
+                      <a:endParaRPr lang="ru-RU" sz="800" dirty="0"/>
+                    </a:p>
+                  </a:txBody>
+                  <a:tcPr/>
+                </a:tc>
+              </a:tr>
+              <a:tr h="370840">
+                <a:tc>
+                  <a:txBody>
+                    <a:bodyPr/>
+                    <a:lstStyle/>
+                    <a:p>
+                      <a:r>
+                        <a:rPr lang="ru-RU" sz="800" dirty="0" smtClean="0"/>
+                        <a:t>Системное</a:t>
+                      </a:r>
+                      <a:endParaRPr lang="ru-RU" sz="800" dirty="0"/>
+                    </a:p>
+                  </a:txBody>
+                  <a:tcPr/>
+                </a:tc>
+                <a:tc>
+                  <a:txBody>
+                    <a:bodyPr/>
+                    <a:lstStyle/>
+                    <a:p>
+                      <a:r>
+                        <a:rPr lang="ru-RU" sz="800" dirty="0" smtClean="0"/>
+                        <a:t>Взаимодействие клиентской и серверной частей программы</a:t>
+                      </a:r>
+                      <a:endParaRPr lang="ru-RU" sz="800" dirty="0"/>
+                    </a:p>
+                  </a:txBody>
+                  <a:tcPr/>
+                </a:tc>
+                <a:tc>
+                  <a:txBody>
+                    <a:bodyPr/>
+                    <a:lstStyle/>
+                    <a:p>
+                      <a:r>
+                        <a:rPr lang="ru-RU" sz="800" dirty="0" err="1" smtClean="0"/>
+                        <a:t>Валидный</a:t>
+                      </a:r>
+                      <a:r>
+                        <a:rPr lang="ru-RU" sz="800" baseline="0" dirty="0" smtClean="0"/>
+                        <a:t> р</a:t>
+                      </a:r>
+                      <a:r>
+                        <a:rPr lang="ru-RU" sz="800" dirty="0" smtClean="0"/>
+                        <a:t>еестр, который необходимо добавить в систему документооборота</a:t>
+                      </a:r>
+                      <a:endParaRPr lang="ru-RU" sz="800" dirty="0"/>
+                    </a:p>
+                  </a:txBody>
+                  <a:tcPr/>
+                </a:tc>
+                <a:tc>
+                  <a:txBody>
+                    <a:bodyPr/>
+                    <a:lstStyle/>
+                    <a:p>
+                      <a:r>
+                        <a:rPr lang="ru-RU" sz="800" dirty="0" smtClean="0"/>
+                        <a:t>Импорт данных реестра в промежуточные таблицы БД</a:t>
+                      </a:r>
+                      <a:endParaRPr lang="ru-RU" sz="800" dirty="0"/>
+                    </a:p>
+                  </a:txBody>
+                  <a:tcPr/>
+                </a:tc>
+                <a:tc>
+                  <a:txBody>
+                    <a:bodyPr/>
+                    <a:lstStyle/>
+                    <a:p>
+                      <a:pPr marL="0" marR="0" indent="0" algn="l" defTabSz="914400" rtl="0" eaLnBrk="1" fontAlgn="auto" latinLnBrk="0" hangingPunct="1">
+                        <a:lnSpc>
+                          <a:spcPct val="100000"/>
+                        </a:lnSpc>
+                        <a:spcBef>
+                          <a:spcPts val="0"/>
+                        </a:spcBef>
+                        <a:spcAft>
+                          <a:spcPts val="0"/>
+                        </a:spcAft>
+                        <a:buClr>
+                          <a:srgbClr val="000000"/>
+                        </a:buClr>
+                        <a:buSzTx/>
+                        <a:buFont typeface="Arial"/>
+                        <a:buNone/>
+                        <a:tabLst/>
+                        <a:defRPr/>
+                      </a:pPr>
+                      <a:r>
+                        <a:rPr lang="ru-RU" sz="800" dirty="0" smtClean="0"/>
+                        <a:t>Импорт данных реестра в промежуточные таблицы БД</a:t>
+                      </a:r>
+                    </a:p>
+                    <a:p>
+                      <a:endParaRPr lang="ru-RU" sz="800" dirty="0"/>
+                    </a:p>
+                  </a:txBody>
+                  <a:tcPr/>
+                </a:tc>
+              </a:tr>
+            </a:tbl>
+          </a:graphicData>
+        </a:graphic>
+      </p:graphicFrame>
     </p:spTree>
   </p:cSld>
   <p:clrMapOvr>
     <a:masterClrMapping/>
   </p:clrMapOvr>
+  <p:timing>
+    <p:tnLst>
+      <p:par>
+        <p:cTn id="1" dur="indefinite" restart="never" nodeType="tmRoot"/>
+      </p:par>
+    </p:tnLst>
+  </p:timing>
 </p:sld>
 </file>
 
@@ -11901,7 +12419,19 @@
               <a:defRPr/>
             </a:pPr>
             <a:r>
-              <a:rPr kumimoji="0" lang="ru-RU" sz="1400" b="0" i="0" u="none" strike="noStrike" kern="0" cap="none" spc="0" normalizeH="0" baseline="0" noProof="0" dirty="0" smtClean="0">
+              <a:rPr lang="ru-RU" dirty="0" smtClean="0">
+                <a:solidFill>
+                  <a:schemeClr val="accent1"/>
+                </a:solidFill>
+                <a:latin typeface="Lato"/>
+                <a:ea typeface="Lato"/>
+                <a:cs typeface="Lato"/>
+                <a:sym typeface="Lato"/>
+              </a:rPr>
+              <a:t>2</a:t>
+            </a:r>
+            <a:r>
+              <a:rPr kumimoji="0" lang="ru-RU" sz="1400" b="0" i="0" u="none" strike="noStrike" kern="0" cap="none" spc="0" normalizeH="0" noProof="0" dirty="0" smtClean="0">
                 <a:ln>
                   <a:noFill/>
                 </a:ln>
@@ -11916,25 +12446,7 @@
                 <a:cs typeface="Lato"/>
                 <a:sym typeface="Lato"/>
               </a:rPr>
-              <a:t>1</a:t>
-            </a:r>
-            <a:r>
-              <a:rPr kumimoji="0" lang="ru-RU" sz="1400" b="0" i="0" u="none" strike="noStrike" kern="0" cap="none" spc="0" normalizeH="0" noProof="0" dirty="0" smtClean="0">
-                <a:ln>
-                  <a:noFill/>
-                </a:ln>
-                <a:solidFill>
-                  <a:schemeClr val="accent1"/>
-                </a:solidFill>
-                <a:effectLst/>
-                <a:uLnTx/>
-                <a:uFillTx/>
-                <a:latin typeface="Lato"/>
-                <a:ea typeface="Lato"/>
-                <a:cs typeface="Lato"/>
-                <a:sym typeface="Lato"/>
-              </a:rPr>
-              <a:t>/20</a:t>
+              <a:t>/23</a:t>
             </a:r>
             <a:endParaRPr kumimoji="0" lang="ru-RU" sz="1400" b="0" i="0" u="none" strike="noStrike" kern="0" cap="none" spc="0" normalizeH="0" baseline="0" noProof="0" dirty="0">
               <a:ln>
@@ -11959,6 +12471,13 @@
   <p:clrMapOvr>
     <a:masterClrMapping/>
   </p:clrMapOvr>
+  <p:timing>
+    <p:tnLst>
+      <p:par>
+        <p:cTn id="1" dur="indefinite" restart="never" nodeType="tmRoot"/>
+      </p:par>
+    </p:tnLst>
+  </p:timing>
 </p:sld>
 </file>
 
@@ -12082,7 +12601,19 @@
               <a:defRPr/>
             </a:pPr>
             <a:r>
-              <a:rPr kumimoji="0" lang="ru-RU" sz="1400" b="0" i="0" u="none" strike="noStrike" kern="0" cap="none" spc="0" normalizeH="0" baseline="0" noProof="0" dirty="0" smtClean="0">
+              <a:rPr lang="ru-RU" dirty="0" smtClean="0">
+                <a:solidFill>
+                  <a:schemeClr val="accent1"/>
+                </a:solidFill>
+                <a:latin typeface="Lato"/>
+                <a:ea typeface="Lato"/>
+                <a:cs typeface="Lato"/>
+                <a:sym typeface="Lato"/>
+              </a:rPr>
+              <a:t>20</a:t>
+            </a:r>
+            <a:r>
+              <a:rPr kumimoji="0" lang="ru-RU" sz="1400" b="0" i="0" u="none" strike="noStrike" kern="0" cap="none" spc="0" normalizeH="0" noProof="0" dirty="0" smtClean="0">
                 <a:ln>
                   <a:noFill/>
                 </a:ln>
@@ -12097,25 +12628,7 @@
                 <a:cs typeface="Lato"/>
                 <a:sym typeface="Lato"/>
               </a:rPr>
-              <a:t>19</a:t>
-            </a:r>
-            <a:r>
-              <a:rPr kumimoji="0" lang="ru-RU" sz="1400" b="0" i="0" u="none" strike="noStrike" kern="0" cap="none" spc="0" normalizeH="0" noProof="0" dirty="0" smtClean="0">
-                <a:ln>
-                  <a:noFill/>
-                </a:ln>
-                <a:solidFill>
-                  <a:schemeClr val="accent1"/>
-                </a:solidFill>
-                <a:effectLst/>
-                <a:uLnTx/>
-                <a:uFillTx/>
-                <a:latin typeface="Lato"/>
-                <a:ea typeface="Lato"/>
-                <a:cs typeface="Lato"/>
-                <a:sym typeface="Lato"/>
-              </a:rPr>
-              <a:t>/20</a:t>
+              <a:t>/23</a:t>
             </a:r>
             <a:endParaRPr kumimoji="0" lang="ru-RU" sz="1400" b="0" i="0" u="none" strike="noStrike" kern="0" cap="none" spc="0" normalizeH="0" baseline="0" noProof="0" dirty="0">
               <a:ln>
@@ -12140,6 +12653,13 @@
   <p:clrMapOvr>
     <a:masterClrMapping/>
   </p:clrMapOvr>
+  <p:timing>
+    <p:tnLst>
+      <p:par>
+        <p:cTn id="1" dur="indefinite" restart="never" nodeType="tmRoot"/>
+      </p:par>
+    </p:tnLst>
+  </p:timing>
 </p:sld>
 </file>
 
@@ -12177,11 +12697,7 @@
           <a:p>
             <a:r>
               <a:rPr lang="ru-RU" dirty="0" smtClean="0"/>
-              <a:t>Интерфейс добавление </a:t>
-            </a:r>
-            <a:r>
-              <a:rPr lang="ru-RU" dirty="0" smtClean="0"/>
-              <a:t>реестра</a:t>
+              <a:t>Интерфейс добавление реестра</a:t>
             </a:r>
             <a:br>
               <a:rPr lang="ru-RU" dirty="0" smtClean="0"/>
@@ -12207,8 +12723,8 @@
         </p:blipFill>
         <p:spPr bwMode="auto">
           <a:xfrm>
-            <a:off x="1905753" y="1904888"/>
-            <a:ext cx="4630849" cy="2535942"/>
+            <a:off x="316870" y="1854877"/>
+            <a:ext cx="3936689" cy="2155807"/>
           </a:xfrm>
           <a:prstGeom prst="rect">
             <a:avLst/>
@@ -12223,15 +12739,364 @@
           <a:effectLst/>
         </p:spPr>
       </p:pic>
+      <p:pic>
+        <p:nvPicPr>
+          <p:cNvPr id="3075" name="Picture 3"/>
+          <p:cNvPicPr>
+            <a:picLocks noChangeAspect="1" noChangeArrowheads="1"/>
+          </p:cNvPicPr>
+          <p:nvPr/>
+        </p:nvPicPr>
+        <p:blipFill>
+          <a:blip r:embed="rId3"/>
+          <a:srcRect/>
+          <a:stretch>
+            <a:fillRect/>
+          </a:stretch>
+        </p:blipFill>
+        <p:spPr bwMode="auto">
+          <a:xfrm>
+            <a:off x="4955181" y="1878593"/>
+            <a:ext cx="3800365" cy="1937441"/>
+          </a:xfrm>
+          <a:prstGeom prst="rect">
+            <a:avLst/>
+          </a:prstGeom>
+          <a:noFill/>
+          <a:ln w="9525">
+            <a:noFill/>
+            <a:miter lim="800000"/>
+            <a:headEnd/>
+            <a:tailEnd/>
+          </a:ln>
+          <a:effectLst/>
+        </p:spPr>
+      </p:pic>
+      <p:sp>
+        <p:nvSpPr>
+          <p:cNvPr id="5" name="Google Shape;100;p15"/>
+          <p:cNvSpPr txBox="1">
+            <a:spLocks/>
+          </p:cNvSpPr>
+          <p:nvPr/>
+        </p:nvSpPr>
+        <p:spPr>
+          <a:xfrm>
+            <a:off x="7757957" y="4471687"/>
+            <a:ext cx="1386043" cy="671813"/>
+          </a:xfrm>
+          <a:prstGeom prst="rect">
+            <a:avLst/>
+          </a:prstGeom>
+          <a:noFill/>
+          <a:ln>
+            <a:noFill/>
+          </a:ln>
+        </p:spPr>
+        <p:txBody>
+          <a:bodyPr spcFirstLastPara="1" wrap="square" lIns="91425" tIns="91425" rIns="91425" bIns="91425" anchor="t" anchorCtr="0">
+            <a:noAutofit/>
+          </a:bodyPr>
+          <a:lstStyle/>
+          <a:p>
+            <a:pPr marL="0" marR="0" lvl="0" indent="0" algn="l" defTabSz="914400" rtl="0" eaLnBrk="1" fontAlgn="auto" latinLnBrk="0" hangingPunct="1">
+              <a:lnSpc>
+                <a:spcPct val="115000"/>
+              </a:lnSpc>
+              <a:spcBef>
+                <a:spcPts val="0"/>
+              </a:spcBef>
+              <a:spcAft>
+                <a:spcPts val="1600"/>
+              </a:spcAft>
+              <a:buClr>
+                <a:schemeClr val="accent1"/>
+              </a:buClr>
+              <a:buSzPts val="1300"/>
+              <a:buFont typeface="Lato"/>
+              <a:buNone/>
+              <a:tabLst/>
+              <a:defRPr/>
+            </a:pPr>
+            <a:r>
+              <a:rPr lang="ru-RU" dirty="0" smtClean="0">
+                <a:solidFill>
+                  <a:schemeClr val="accent1"/>
+                </a:solidFill>
+                <a:latin typeface="Lato"/>
+                <a:ea typeface="Lato"/>
+                <a:cs typeface="Lato"/>
+                <a:sym typeface="Lato"/>
+              </a:rPr>
+              <a:t>21</a:t>
+            </a:r>
+            <a:r>
+              <a:rPr kumimoji="0" lang="ru-RU" sz="1400" b="0" i="0" u="none" strike="noStrike" kern="0" cap="none" spc="0" normalizeH="0" noProof="0" dirty="0" smtClean="0">
+                <a:ln>
+                  <a:noFill/>
+                </a:ln>
+                <a:solidFill>
+                  <a:schemeClr val="accent1"/>
+                </a:solidFill>
+                <a:effectLst/>
+                <a:uLnTx/>
+                <a:uFillTx/>
+                <a:latin typeface="Lato"/>
+                <a:ea typeface="Lato"/>
+                <a:cs typeface="Lato"/>
+                <a:sym typeface="Lato"/>
+              </a:rPr>
+              <a:t>/23</a:t>
+            </a:r>
+            <a:endParaRPr kumimoji="0" lang="ru-RU" sz="1400" b="0" i="0" u="none" strike="noStrike" kern="0" cap="none" spc="0" normalizeH="0" baseline="0" noProof="0" dirty="0">
+              <a:ln>
+                <a:noFill/>
+              </a:ln>
+              <a:solidFill>
+                <a:schemeClr val="accent1"/>
+              </a:solidFill>
+              <a:effectLst/>
+              <a:uLnTx/>
+              <a:uFillTx/>
+              <a:latin typeface="Lato"/>
+              <a:ea typeface="Lato"/>
+              <a:cs typeface="Lato"/>
+              <a:sym typeface="Lato"/>
+            </a:endParaRPr>
+          </a:p>
+        </p:txBody>
+      </p:sp>
     </p:spTree>
   </p:cSld>
   <p:clrMapOvr>
     <a:masterClrMapping/>
   </p:clrMapOvr>
+  <p:timing>
+    <p:tnLst>
+      <p:par>
+        <p:cTn id="1" dur="indefinite" restart="never" nodeType="tmRoot"/>
+      </p:par>
+    </p:tnLst>
+  </p:timing>
 </p:sld>
 </file>
 
 <file path=ppt/slides/slide22.xml><?xml version="1.0" encoding="utf-8"?>
+<p:sld xmlns:a="http://schemas.openxmlformats.org/drawingml/2006/main" xmlns:r="http://schemas.openxmlformats.org/officeDocument/2006/relationships" xmlns:p="http://schemas.openxmlformats.org/presentationml/2006/main">
+  <p:cSld>
+    <p:spTree>
+      <p:nvGrpSpPr>
+        <p:cNvPr id="1" name=""/>
+        <p:cNvGrpSpPr/>
+        <p:nvPr/>
+      </p:nvGrpSpPr>
+      <p:grpSpPr>
+        <a:xfrm>
+          <a:off x="0" y="0"/>
+          <a:ext cx="0" cy="0"/>
+          <a:chOff x="0" y="0"/>
+          <a:chExt cx="0" cy="0"/>
+        </a:xfrm>
+      </p:grpSpPr>
+      <p:sp>
+        <p:nvSpPr>
+          <p:cNvPr id="2" name="Заголовок 1"/>
+          <p:cNvSpPr>
+            <a:spLocks noGrp="1"/>
+          </p:cNvSpPr>
+          <p:nvPr>
+            <p:ph type="title"/>
+          </p:nvPr>
+        </p:nvSpPr>
+        <p:spPr/>
+        <p:txBody>
+          <a:bodyPr/>
+          <a:lstStyle/>
+          <a:p>
+            <a:r>
+              <a:rPr lang="ru-RU" dirty="0" smtClean="0"/>
+              <a:t>Интерфейс результатов добавления реестра</a:t>
+            </a:r>
+            <a:endParaRPr lang="ru-RU" dirty="0"/>
+          </a:p>
+        </p:txBody>
+      </p:sp>
+      <p:pic>
+        <p:nvPicPr>
+          <p:cNvPr id="53250" name="Picture 2"/>
+          <p:cNvPicPr>
+            <a:picLocks noChangeAspect="1" noChangeArrowheads="1"/>
+          </p:cNvPicPr>
+          <p:nvPr/>
+        </p:nvPicPr>
+        <p:blipFill>
+          <a:blip r:embed="rId2"/>
+          <a:srcRect/>
+          <a:stretch>
+            <a:fillRect/>
+          </a:stretch>
+        </p:blipFill>
+        <p:spPr bwMode="auto">
+          <a:xfrm>
+            <a:off x="476382" y="1932916"/>
+            <a:ext cx="3567646" cy="1831882"/>
+          </a:xfrm>
+          <a:prstGeom prst="rect">
+            <a:avLst/>
+          </a:prstGeom>
+          <a:noFill/>
+          <a:ln w="9525">
+            <a:noFill/>
+            <a:miter lim="800000"/>
+            <a:headEnd/>
+            <a:tailEnd/>
+          </a:ln>
+          <a:effectLst/>
+        </p:spPr>
+      </p:pic>
+      <p:pic>
+        <p:nvPicPr>
+          <p:cNvPr id="53251" name="Picture 3"/>
+          <p:cNvPicPr>
+            <a:picLocks noChangeAspect="1" noChangeArrowheads="1"/>
+          </p:cNvPicPr>
+          <p:nvPr/>
+        </p:nvPicPr>
+        <p:blipFill>
+          <a:blip r:embed="rId3"/>
+          <a:srcRect/>
+          <a:stretch>
+            <a:fillRect/>
+          </a:stretch>
+        </p:blipFill>
+        <p:spPr bwMode="auto">
+          <a:xfrm>
+            <a:off x="4677358" y="1869541"/>
+            <a:ext cx="3960331" cy="1973879"/>
+          </a:xfrm>
+          <a:prstGeom prst="rect">
+            <a:avLst/>
+          </a:prstGeom>
+          <a:noFill/>
+          <a:ln w="9525">
+            <a:noFill/>
+            <a:miter lim="800000"/>
+            <a:headEnd/>
+            <a:tailEnd/>
+          </a:ln>
+          <a:effectLst/>
+        </p:spPr>
+      </p:pic>
+      <p:sp>
+        <p:nvSpPr>
+          <p:cNvPr id="5" name="Google Shape;100;p15"/>
+          <p:cNvSpPr txBox="1">
+            <a:spLocks/>
+          </p:cNvSpPr>
+          <p:nvPr/>
+        </p:nvSpPr>
+        <p:spPr>
+          <a:xfrm>
+            <a:off x="7757957" y="4471687"/>
+            <a:ext cx="1386043" cy="671813"/>
+          </a:xfrm>
+          <a:prstGeom prst="rect">
+            <a:avLst/>
+          </a:prstGeom>
+          <a:noFill/>
+          <a:ln>
+            <a:noFill/>
+          </a:ln>
+        </p:spPr>
+        <p:txBody>
+          <a:bodyPr spcFirstLastPara="1" wrap="square" lIns="91425" tIns="91425" rIns="91425" bIns="91425" anchor="t" anchorCtr="0">
+            <a:noAutofit/>
+          </a:bodyPr>
+          <a:lstStyle/>
+          <a:p>
+            <a:pPr marL="0" marR="0" lvl="0" indent="0" algn="l" defTabSz="914400" rtl="0" eaLnBrk="1" fontAlgn="auto" latinLnBrk="0" hangingPunct="1">
+              <a:lnSpc>
+                <a:spcPct val="115000"/>
+              </a:lnSpc>
+              <a:spcBef>
+                <a:spcPts val="0"/>
+              </a:spcBef>
+              <a:spcAft>
+                <a:spcPts val="1600"/>
+              </a:spcAft>
+              <a:buClr>
+                <a:schemeClr val="accent1"/>
+              </a:buClr>
+              <a:buSzPts val="1300"/>
+              <a:buFont typeface="Lato"/>
+              <a:buNone/>
+              <a:tabLst/>
+              <a:defRPr/>
+            </a:pPr>
+            <a:r>
+              <a:rPr lang="ru-RU" dirty="0" smtClean="0">
+                <a:solidFill>
+                  <a:schemeClr val="accent1"/>
+                </a:solidFill>
+                <a:latin typeface="Lato"/>
+                <a:ea typeface="Lato"/>
+                <a:cs typeface="Lato"/>
+                <a:sym typeface="Lato"/>
+              </a:rPr>
+              <a:t>22</a:t>
+            </a:r>
+            <a:r>
+              <a:rPr kumimoji="0" lang="ru-RU" sz="1400" b="0" i="0" u="none" strike="noStrike" kern="0" cap="none" spc="0" normalizeH="0" noProof="0" dirty="0" smtClean="0">
+                <a:ln>
+                  <a:noFill/>
+                </a:ln>
+                <a:solidFill>
+                  <a:schemeClr val="accent1"/>
+                </a:solidFill>
+                <a:effectLst/>
+                <a:uLnTx/>
+                <a:uFillTx/>
+                <a:latin typeface="Lato"/>
+                <a:ea typeface="Lato"/>
+                <a:cs typeface="Lato"/>
+                <a:sym typeface="Lato"/>
+              </a:rPr>
+              <a:t>/23</a:t>
+            </a:r>
+            <a:endParaRPr kumimoji="0" lang="ru-RU" sz="1400" b="0" i="0" u="none" strike="noStrike" kern="0" cap="none" spc="0" normalizeH="0" baseline="0" noProof="0" dirty="0">
+              <a:ln>
+                <a:noFill/>
+              </a:ln>
+              <a:solidFill>
+                <a:schemeClr val="accent1"/>
+              </a:solidFill>
+              <a:effectLst/>
+              <a:uLnTx/>
+              <a:uFillTx/>
+              <a:latin typeface="Lato"/>
+              <a:ea typeface="Lato"/>
+              <a:cs typeface="Lato"/>
+              <a:sym typeface="Lato"/>
+            </a:endParaRPr>
+          </a:p>
+        </p:txBody>
+      </p:sp>
+    </p:spTree>
+  </p:cSld>
+  <p:clrMapOvr>
+    <a:masterClrMapping/>
+  </p:clrMapOvr>
+  <p:timing>
+    <p:tnLst>
+      <p:par>
+        <p:cTn id="1" dur="indefinite" restart="never" nodeType="tmRoot"/>
+      </p:par>
+    </p:tnLst>
+  </p:timing>
+</p:sld>
+</file>
+
+<file path=ppt/slides/slide23.xml><?xml version="1.0" encoding="utf-8"?>
 <p:sld xmlns:a="http://schemas.openxmlformats.org/drawingml/2006/main" xmlns:r="http://schemas.openxmlformats.org/officeDocument/2006/relationships" xmlns:p="http://schemas.openxmlformats.org/presentationml/2006/main">
   <p:cSld>
     <p:spTree>
@@ -12325,10 +13190,20 @@
               <a:buNone/>
             </a:pPr>
             <a:r>
-              <a:rPr lang="ru" dirty="0"/>
+              <a:rPr lang="ru" dirty="0">
+                <a:solidFill>
+                  <a:schemeClr val="bg2"/>
+                </a:solidFill>
+                <a:latin typeface="+mj-lt"/>
+              </a:rPr>
               <a:t>В результате выполнения работы по разработке модуля импорта и корректировки реестров договоров, можно сделать вывод о том, что разработанной продукт полностью удовлетворяет потребностям страховой компании в быстродействии, надежности и удобству взаимодействия с ним.</a:t>
             </a:r>
-            <a:endParaRPr/>
+            <a:endParaRPr>
+              <a:solidFill>
+                <a:schemeClr val="bg2"/>
+              </a:solidFill>
+              <a:latin typeface="+mj-lt"/>
+            </a:endParaRPr>
           </a:p>
           <a:p>
             <a:pPr marL="0" lvl="0" indent="0" algn="l" rtl="0">
@@ -12341,30 +13216,56 @@
               <a:buNone/>
             </a:pPr>
             <a:r>
-              <a:rPr lang="ru" dirty="0"/>
+              <a:rPr lang="ru" dirty="0">
+                <a:solidFill>
+                  <a:schemeClr val="bg2"/>
+                </a:solidFill>
+                <a:latin typeface="+mj-lt"/>
+              </a:rPr>
               <a:t>         </a:t>
             </a:r>
             <a:r>
-              <a:rPr lang="ru" dirty="0" smtClean="0"/>
+              <a:rPr lang="ru" dirty="0" smtClean="0">
+                <a:solidFill>
+                  <a:schemeClr val="bg2"/>
+                </a:solidFill>
+                <a:latin typeface="+mj-lt"/>
+              </a:rPr>
               <a:t>Рассматривая </a:t>
             </a:r>
             <a:r>
-              <a:rPr lang="ru" dirty="0"/>
-              <a:t>приобретение модуля импорта и корректировки реестров договоров со стороны страховой компании, можно выделить большое количество положительных моментов, среди которых можно выделить такие, как: уменьшение количества времени, затрачиваемого на обслуживание клиента, </a:t>
-            </a:r>
-            <a:r>
-              <a:rPr lang="ru"/>
-              <a:t>ускорение </a:t>
-            </a:r>
-            <a:r>
-              <a:rPr lang="ru" smtClean="0"/>
+              <a:rPr lang="ru" dirty="0">
+                <a:solidFill>
+                  <a:schemeClr val="bg2"/>
+                </a:solidFill>
+                <a:latin typeface="+mj-lt"/>
+              </a:rPr>
+              <a:t>приобретение модуля импорта и корректировки реестров договоров со стороны страховой компании, можно выделить большое количество положительных моментов, среди которых можно выделить такие, как: уменьшение количества времени, затрачиваемого на обслуживание клиента, ускорение </a:t>
+            </a:r>
+            <a:r>
+              <a:rPr lang="ru" dirty="0" smtClean="0">
+                <a:solidFill>
+                  <a:schemeClr val="bg2"/>
+                </a:solidFill>
+                <a:latin typeface="+mj-lt"/>
+              </a:rPr>
               <a:t>документооборота и как </a:t>
             </a:r>
             <a:r>
-              <a:rPr lang="ru" dirty="0"/>
+              <a:rPr lang="ru" dirty="0">
+                <a:solidFill>
+                  <a:schemeClr val="bg2"/>
+                </a:solidFill>
+                <a:latin typeface="+mj-lt"/>
+              </a:rPr>
               <a:t>следствие, увеличение прибыли.</a:t>
             </a:r>
-            <a:endParaRPr/>
+            <a:endParaRPr>
+              <a:solidFill>
+                <a:schemeClr val="bg2"/>
+              </a:solidFill>
+              <a:latin typeface="+mj-lt"/>
+            </a:endParaRPr>
           </a:p>
           <a:p>
             <a:pPr marL="0" lvl="0" indent="0" algn="l" rtl="0">
@@ -12436,7 +13337,7 @@
                 <a:cs typeface="Lato"/>
                 <a:sym typeface="Lato"/>
               </a:rPr>
-              <a:t>20</a:t>
+              <a:t>23</a:t>
             </a:r>
             <a:r>
               <a:rPr kumimoji="0" lang="ru-RU" sz="1400" b="0" i="0" u="none" strike="noStrike" kern="0" cap="none" spc="0" normalizeH="0" noProof="0" dirty="0" smtClean="0">
@@ -12454,7 +13355,7 @@
                 <a:cs typeface="Lato"/>
                 <a:sym typeface="Lato"/>
               </a:rPr>
-              <a:t>/20</a:t>
+              <a:t>/23</a:t>
             </a:r>
             <a:endParaRPr kumimoji="0" lang="ru-RU" sz="1400" b="0" i="0" u="none" strike="noStrike" kern="0" cap="none" spc="0" normalizeH="0" baseline="0" noProof="0" dirty="0">
               <a:ln>
@@ -12479,6 +13380,13 @@
   <p:clrMapOvr>
     <a:masterClrMapping/>
   </p:clrMapOvr>
+  <p:timing>
+    <p:tnLst>
+      <p:par>
+        <p:cTn id="1" dur="indefinite" restart="never" nodeType="tmRoot"/>
+      </p:par>
+    </p:tnLst>
+  </p:timing>
 </p:sld>
 </file>
 
@@ -12711,18 +13619,6 @@
               <a:defRPr/>
             </a:pPr>
             <a:r>
-              <a:rPr lang="ru-RU" dirty="0" smtClean="0">
-                <a:solidFill>
-                  <a:schemeClr val="accent1"/>
-                </a:solidFill>
-                <a:latin typeface="Lato"/>
-                <a:ea typeface="Lato"/>
-                <a:cs typeface="Lato"/>
-                <a:sym typeface="Lato"/>
-              </a:rPr>
-              <a:t>2</a:t>
-            </a:r>
-            <a:r>
               <a:rPr kumimoji="0" lang="ru-RU" sz="1400" b="0" i="0" u="none" strike="noStrike" kern="0" cap="none" spc="0" normalizeH="0" noProof="0" dirty="0" smtClean="0">
                 <a:ln>
                   <a:noFill/>
@@ -12738,7 +13634,25 @@
                 <a:cs typeface="Lato"/>
                 <a:sym typeface="Lato"/>
               </a:rPr>
-              <a:t>/20</a:t>
+              <a:t>3</a:t>
+            </a:r>
+            <a:r>
+              <a:rPr kumimoji="0" lang="ru-RU" sz="1400" b="0" i="0" u="none" strike="noStrike" kern="0" cap="none" spc="0" normalizeH="0" noProof="0" dirty="0" smtClean="0">
+                <a:ln>
+                  <a:noFill/>
+                </a:ln>
+                <a:solidFill>
+                  <a:schemeClr val="accent1"/>
+                </a:solidFill>
+                <a:effectLst/>
+                <a:uLnTx/>
+                <a:uFillTx/>
+                <a:latin typeface="Lato"/>
+                <a:ea typeface="Lato"/>
+                <a:cs typeface="Lato"/>
+                <a:sym typeface="Lato"/>
+              </a:rPr>
+              <a:t>/23</a:t>
             </a:r>
             <a:endParaRPr kumimoji="0" lang="ru-RU" sz="1400" b="0" i="0" u="none" strike="noStrike" kern="0" cap="none" spc="0" normalizeH="0" baseline="0" noProof="0" dirty="0">
               <a:ln>
@@ -12763,6 +13677,13 @@
   <p:clrMapOvr>
     <a:masterClrMapping/>
   </p:clrMapOvr>
+  <p:timing>
+    <p:tnLst>
+      <p:par>
+        <p:cTn id="1" dur="indefinite" restart="never" nodeType="tmRoot"/>
+      </p:par>
+    </p:tnLst>
+  </p:timing>
 </p:sld>
 </file>
 
@@ -13046,18 +13967,6 @@
               <a:defRPr/>
             </a:pPr>
             <a:r>
-              <a:rPr lang="ru-RU" dirty="0" smtClean="0">
-                <a:solidFill>
-                  <a:schemeClr val="accent1"/>
-                </a:solidFill>
-                <a:latin typeface="Lato"/>
-                <a:ea typeface="Lato"/>
-                <a:cs typeface="Lato"/>
-                <a:sym typeface="Lato"/>
-              </a:rPr>
-              <a:t>3</a:t>
-            </a:r>
-            <a:r>
               <a:rPr kumimoji="0" lang="ru-RU" sz="1400" b="0" i="0" u="none" strike="noStrike" kern="0" cap="none" spc="0" normalizeH="0" noProof="0" dirty="0" smtClean="0">
                 <a:ln>
                   <a:noFill/>
@@ -13073,7 +13982,25 @@
                 <a:cs typeface="Lato"/>
                 <a:sym typeface="Lato"/>
               </a:rPr>
-              <a:t>/20</a:t>
+              <a:t>4</a:t>
+            </a:r>
+            <a:r>
+              <a:rPr kumimoji="0" lang="ru-RU" sz="1400" b="0" i="0" u="none" strike="noStrike" kern="0" cap="none" spc="0" normalizeH="0" noProof="0" dirty="0" smtClean="0">
+                <a:ln>
+                  <a:noFill/>
+                </a:ln>
+                <a:solidFill>
+                  <a:schemeClr val="accent1"/>
+                </a:solidFill>
+                <a:effectLst/>
+                <a:uLnTx/>
+                <a:uFillTx/>
+                <a:latin typeface="Lato"/>
+                <a:ea typeface="Lato"/>
+                <a:cs typeface="Lato"/>
+                <a:sym typeface="Lato"/>
+              </a:rPr>
+              <a:t>/23</a:t>
             </a:r>
             <a:endParaRPr kumimoji="0" lang="ru-RU" sz="1400" b="0" i="0" u="none" strike="noStrike" kern="0" cap="none" spc="0" normalizeH="0" baseline="0" noProof="0" dirty="0">
               <a:ln>
@@ -13098,6 +14025,13 @@
   <p:clrMapOvr>
     <a:masterClrMapping/>
   </p:clrMapOvr>
+  <p:timing>
+    <p:tnLst>
+      <p:par>
+        <p:cTn id="1" dur="indefinite" restart="never" nodeType="tmRoot"/>
+      </p:par>
+    </p:tnLst>
+  </p:timing>
 </p:sld>
 </file>
 
@@ -13205,46 +14139,49 @@
             </a:r>
           </a:p>
           <a:p>
-            <a:pPr lvl="0">
-              <a:buNone/>
-            </a:pPr>
             <a:r>
               <a:rPr lang="ru-RU" sz="1200" dirty="0" smtClean="0"/>
-              <a:t>Выполнять обработку </a:t>
-            </a:r>
-            <a:r>
-              <a:rPr lang="ru-RU" sz="1200" dirty="0" err="1" smtClean="0"/>
-              <a:t>договоров.</a:t>
-            </a:r>
-            <a:r>
-              <a:rPr lang="ru-RU" sz="1000" dirty="0" err="1" smtClean="0"/>
-              <a:t>Валидация</a:t>
-            </a:r>
-            <a:r>
-              <a:rPr lang="ru-RU" sz="1000" dirty="0" smtClean="0"/>
-              <a:t> </a:t>
-            </a:r>
-            <a:r>
-              <a:rPr lang="ru-RU" sz="1000" dirty="0" smtClean="0"/>
-              <a:t>строк реестра</a:t>
+              <a:t>Выполнять обработку договоров</a:t>
+            </a:r>
+            <a:r>
+              <a:rPr lang="ru-RU" sz="1200" dirty="0" smtClean="0"/>
+              <a:t>.</a:t>
             </a:r>
           </a:p>
           <a:p>
-            <a:pPr lvl="0">
-              <a:buNone/>
+            <a:pPr marL="817200" lvl="3">
+              <a:spcBef>
+                <a:spcPts val="0"/>
+              </a:spcBef>
+              <a:buFont typeface="Courier New" pitchFamily="49" charset="0"/>
+              <a:buChar char="o"/>
             </a:pPr>
             <a:r>
-              <a:rPr lang="ru-RU" sz="1200" dirty="0" err="1" smtClean="0"/>
+              <a:rPr lang="ru-RU" dirty="0" err="1" smtClean="0"/>
+              <a:t>Валидация</a:t>
+            </a:r>
+            <a:r>
+              <a:rPr lang="ru-RU" dirty="0" smtClean="0"/>
+              <a:t> строк реестра.</a:t>
+            </a:r>
+          </a:p>
+          <a:p>
+            <a:pPr marL="817200" lvl="3">
+              <a:spcBef>
+                <a:spcPts val="0"/>
+              </a:spcBef>
+              <a:buFont typeface="Courier New" pitchFamily="49" charset="0"/>
+              <a:buChar char="o"/>
+            </a:pPr>
+            <a:r>
+              <a:rPr lang="ru-RU" dirty="0" err="1" smtClean="0"/>
               <a:t>Донасыщение</a:t>
             </a:r>
             <a:r>
-              <a:rPr lang="ru-RU" sz="1200" dirty="0" smtClean="0"/>
-              <a:t> </a:t>
-            </a:r>
-            <a:r>
-              <a:rPr lang="ru-RU" sz="1200" dirty="0" smtClean="0"/>
-              <a:t>строк реестра</a:t>
-            </a:r>
+              <a:rPr lang="ru-RU" dirty="0" smtClean="0"/>
+              <a:t> строк реестра.</a:t>
+            </a:r>
+            <a:endParaRPr lang="ru-RU" dirty="0" smtClean="0"/>
           </a:p>
           <a:p>
             <a:pPr lvl="0"/>
@@ -13313,18 +14250,6 @@
               <a:defRPr/>
             </a:pPr>
             <a:r>
-              <a:rPr lang="ru-RU" dirty="0" smtClean="0">
-                <a:solidFill>
-                  <a:schemeClr val="accent1"/>
-                </a:solidFill>
-                <a:latin typeface="Lato"/>
-                <a:ea typeface="Lato"/>
-                <a:cs typeface="Lato"/>
-                <a:sym typeface="Lato"/>
-              </a:rPr>
-              <a:t>4</a:t>
-            </a:r>
-            <a:r>
               <a:rPr kumimoji="0" lang="ru-RU" sz="1400" b="0" i="0" u="none" strike="noStrike" kern="0" cap="none" spc="0" normalizeH="0" noProof="0" dirty="0" smtClean="0">
                 <a:ln>
                   <a:noFill/>
@@ -13340,7 +14265,25 @@
                 <a:cs typeface="Lato"/>
                 <a:sym typeface="Lato"/>
               </a:rPr>
-              <a:t>/20</a:t>
+              <a:t>5</a:t>
+            </a:r>
+            <a:r>
+              <a:rPr kumimoji="0" lang="ru-RU" sz="1400" b="0" i="0" u="none" strike="noStrike" kern="0" cap="none" spc="0" normalizeH="0" noProof="0" dirty="0" smtClean="0">
+                <a:ln>
+                  <a:noFill/>
+                </a:ln>
+                <a:solidFill>
+                  <a:schemeClr val="accent1"/>
+                </a:solidFill>
+                <a:effectLst/>
+                <a:uLnTx/>
+                <a:uFillTx/>
+                <a:latin typeface="Lato"/>
+                <a:ea typeface="Lato"/>
+                <a:cs typeface="Lato"/>
+                <a:sym typeface="Lato"/>
+              </a:rPr>
+              <a:t>/23</a:t>
             </a:r>
             <a:endParaRPr kumimoji="0" lang="ru-RU" sz="1400" b="0" i="0" u="none" strike="noStrike" kern="0" cap="none" spc="0" normalizeH="0" baseline="0" noProof="0" dirty="0">
               <a:ln>
@@ -13365,6 +14308,13 @@
   <p:clrMapOvr>
     <a:masterClrMapping/>
   </p:clrMapOvr>
+  <p:timing>
+    <p:tnLst>
+      <p:par>
+        <p:cTn id="1" dur="indefinite" restart="never" nodeType="tmRoot"/>
+      </p:par>
+    </p:tnLst>
+  </p:timing>
 </p:sld>
 </file>
 
@@ -13462,7 +14412,12 @@
               <a:buNone/>
             </a:pPr>
             <a:r>
-              <a:rPr lang="ru" dirty="0" smtClean="0"/>
+              <a:rPr lang="ru" dirty="0" smtClean="0">
+                <a:solidFill>
+                  <a:schemeClr val="bg2"/>
+                </a:solidFill>
+                <a:latin typeface="+mj-lt"/>
+              </a:rPr>
               <a:t>Обработка реестра – трудоемкая задача, которая требует большое количество вычислительных ресурсов.</a:t>
             </a:r>
           </a:p>
@@ -13477,7 +14432,12 @@
               <a:buNone/>
             </a:pPr>
             <a:r>
-              <a:rPr lang="ru" dirty="0" smtClean="0"/>
+              <a:rPr lang="ru" dirty="0" smtClean="0">
+                <a:solidFill>
+                  <a:schemeClr val="bg2"/>
+                </a:solidFill>
+                <a:latin typeface="+mj-lt"/>
+              </a:rPr>
               <a:t>В случае синхронного выполнения нескольких задач по обработке реестров, велика вероятность выхода из строя рабочей машины, вследствие высокой нагрузки.</a:t>
             </a:r>
           </a:p>
@@ -13492,10 +14452,20 @@
               <a:buNone/>
             </a:pPr>
             <a:r>
-              <a:rPr lang="ru" dirty="0" smtClean="0"/>
+              <a:rPr lang="ru" dirty="0" smtClean="0">
+                <a:solidFill>
+                  <a:schemeClr val="bg2"/>
+                </a:solidFill>
+                <a:latin typeface="+mj-lt"/>
+              </a:rPr>
               <a:t>Для избежания вышеизложенного, было принято решение организовать асинхронную обработку реестра.</a:t>
             </a:r>
-            <a:endParaRPr/>
+            <a:endParaRPr>
+              <a:solidFill>
+                <a:schemeClr val="bg2"/>
+              </a:solidFill>
+              <a:latin typeface="+mj-lt"/>
+            </a:endParaRPr>
           </a:p>
         </p:txBody>
       </p:sp>
@@ -13546,18 +14516,6 @@
               <a:defRPr/>
             </a:pPr>
             <a:r>
-              <a:rPr lang="ru-RU" dirty="0" smtClean="0">
-                <a:solidFill>
-                  <a:schemeClr val="accent1"/>
-                </a:solidFill>
-                <a:latin typeface="Lato"/>
-                <a:ea typeface="Lato"/>
-                <a:cs typeface="Lato"/>
-                <a:sym typeface="Lato"/>
-              </a:rPr>
-              <a:t>5</a:t>
-            </a:r>
-            <a:r>
               <a:rPr kumimoji="0" lang="ru-RU" sz="1400" b="0" i="0" u="none" strike="noStrike" kern="0" cap="none" spc="0" normalizeH="0" noProof="0" dirty="0" smtClean="0">
                 <a:ln>
                   <a:noFill/>
@@ -13573,7 +14531,25 @@
                 <a:cs typeface="Lato"/>
                 <a:sym typeface="Lato"/>
               </a:rPr>
-              <a:t>/20</a:t>
+              <a:t>6</a:t>
+            </a:r>
+            <a:r>
+              <a:rPr kumimoji="0" lang="ru-RU" sz="1400" b="0" i="0" u="none" strike="noStrike" kern="0" cap="none" spc="0" normalizeH="0" noProof="0" dirty="0" smtClean="0">
+                <a:ln>
+                  <a:noFill/>
+                </a:ln>
+                <a:solidFill>
+                  <a:schemeClr val="accent1"/>
+                </a:solidFill>
+                <a:effectLst/>
+                <a:uLnTx/>
+                <a:uFillTx/>
+                <a:latin typeface="Lato"/>
+                <a:ea typeface="Lato"/>
+                <a:cs typeface="Lato"/>
+                <a:sym typeface="Lato"/>
+              </a:rPr>
+              <a:t>/23</a:t>
             </a:r>
             <a:endParaRPr kumimoji="0" lang="ru-RU" sz="1400" b="0" i="0" u="none" strike="noStrike" kern="0" cap="none" spc="0" normalizeH="0" baseline="0" noProof="0" dirty="0">
               <a:ln>
@@ -13598,6 +14574,13 @@
   <p:clrMapOvr>
     <a:masterClrMapping/>
   </p:clrMapOvr>
+  <p:timing>
+    <p:tnLst>
+      <p:par>
+        <p:cTn id="1" dur="indefinite" restart="never" nodeType="tmRoot"/>
+      </p:par>
+    </p:tnLst>
+  </p:timing>
 </p:sld>
 </file>
 
@@ -13695,8 +14678,12 @@
               <a:buNone/>
             </a:pPr>
             <a:r>
-              <a:rPr lang="ru"/>
-              <a:t>В качестве решения выступает брокер сообщений RabbitMQ</a:t>
+              <a:rPr lang="ru" dirty="0"/>
+              <a:t>В качестве решения выступает брокер сообщений </a:t>
+            </a:r>
+            <a:r>
+              <a:rPr lang="ru" dirty="0" smtClean="0"/>
+              <a:t>RabbitMQ.</a:t>
             </a:r>
             <a:endParaRPr/>
           </a:p>
@@ -13777,18 +14764,6 @@
               <a:defRPr/>
             </a:pPr>
             <a:r>
-              <a:rPr lang="ru-RU" dirty="0" smtClean="0">
-                <a:solidFill>
-                  <a:schemeClr val="accent1"/>
-                </a:solidFill>
-                <a:latin typeface="Lato"/>
-                <a:ea typeface="Lato"/>
-                <a:cs typeface="Lato"/>
-                <a:sym typeface="Lato"/>
-              </a:rPr>
-              <a:t>6</a:t>
-            </a:r>
-            <a:r>
               <a:rPr kumimoji="0" lang="ru-RU" sz="1400" b="0" i="0" u="none" strike="noStrike" kern="0" cap="none" spc="0" normalizeH="0" noProof="0" dirty="0" smtClean="0">
                 <a:ln>
                   <a:noFill/>
@@ -13804,7 +14779,25 @@
                 <a:cs typeface="Lato"/>
                 <a:sym typeface="Lato"/>
               </a:rPr>
-              <a:t>/20</a:t>
+              <a:t>7</a:t>
+            </a:r>
+            <a:r>
+              <a:rPr kumimoji="0" lang="ru-RU" sz="1400" b="0" i="0" u="none" strike="noStrike" kern="0" cap="none" spc="0" normalizeH="0" noProof="0" dirty="0" smtClean="0">
+                <a:ln>
+                  <a:noFill/>
+                </a:ln>
+                <a:solidFill>
+                  <a:schemeClr val="accent1"/>
+                </a:solidFill>
+                <a:effectLst/>
+                <a:uLnTx/>
+                <a:uFillTx/>
+                <a:latin typeface="Lato"/>
+                <a:ea typeface="Lato"/>
+                <a:cs typeface="Lato"/>
+                <a:sym typeface="Lato"/>
+              </a:rPr>
+              <a:t>/23</a:t>
             </a:r>
             <a:endParaRPr kumimoji="0" lang="ru-RU" sz="1400" b="0" i="0" u="none" strike="noStrike" kern="0" cap="none" spc="0" normalizeH="0" baseline="0" noProof="0" dirty="0">
               <a:ln>
@@ -13829,6 +14822,13 @@
   <p:clrMapOvr>
     <a:masterClrMapping/>
   </p:clrMapOvr>
+  <p:timing>
+    <p:tnLst>
+      <p:par>
+        <p:cTn id="1" dur="indefinite" restart="never" nodeType="tmRoot"/>
+      </p:par>
+    </p:tnLst>
+  </p:timing>
 </p:sld>
 </file>
 
@@ -14459,18 +15459,6 @@
               <a:defRPr/>
             </a:pPr>
             <a:r>
-              <a:rPr lang="ru-RU" dirty="0" smtClean="0">
-                <a:solidFill>
-                  <a:schemeClr val="accent1"/>
-                </a:solidFill>
-                <a:latin typeface="Lato"/>
-                <a:ea typeface="Lato"/>
-                <a:cs typeface="Lato"/>
-                <a:sym typeface="Lato"/>
-              </a:rPr>
-              <a:t>7</a:t>
-            </a:r>
-            <a:r>
               <a:rPr kumimoji="0" lang="ru-RU" sz="1400" b="0" i="0" u="none" strike="noStrike" kern="0" cap="none" spc="0" normalizeH="0" noProof="0" dirty="0" smtClean="0">
                 <a:ln>
                   <a:noFill/>
@@ -14486,7 +15474,25 @@
                 <a:cs typeface="Lato"/>
                 <a:sym typeface="Lato"/>
               </a:rPr>
-              <a:t>/20</a:t>
+              <a:t>8</a:t>
+            </a:r>
+            <a:r>
+              <a:rPr kumimoji="0" lang="ru-RU" sz="1400" b="0" i="0" u="none" strike="noStrike" kern="0" cap="none" spc="0" normalizeH="0" noProof="0" dirty="0" smtClean="0">
+                <a:ln>
+                  <a:noFill/>
+                </a:ln>
+                <a:solidFill>
+                  <a:schemeClr val="accent1"/>
+                </a:solidFill>
+                <a:effectLst/>
+                <a:uLnTx/>
+                <a:uFillTx/>
+                <a:latin typeface="Lato"/>
+                <a:ea typeface="Lato"/>
+                <a:cs typeface="Lato"/>
+                <a:sym typeface="Lato"/>
+              </a:rPr>
+              <a:t>/23</a:t>
             </a:r>
             <a:endParaRPr kumimoji="0" lang="ru-RU" sz="1400" b="0" i="0" u="none" strike="noStrike" kern="0" cap="none" spc="0" normalizeH="0" baseline="0" noProof="0" dirty="0">
               <a:ln>
@@ -14511,6 +15517,13 @@
   <p:clrMapOvr>
     <a:masterClrMapping/>
   </p:clrMapOvr>
+  <p:timing>
+    <p:tnLst>
+      <p:par>
+        <p:cTn id="1" dur="indefinite" restart="never" nodeType="tmRoot"/>
+      </p:par>
+    </p:tnLst>
+  </p:timing>
 </p:sld>
 </file>
 
@@ -14608,7 +15621,7 @@
               <a:buNone/>
             </a:pPr>
             <a:r>
-              <a:rPr lang="ru" sz="1400">
+              <a:rPr lang="ru" sz="1400" dirty="0">
                 <a:solidFill>
                   <a:srgbClr val="000000"/>
                 </a:solidFill>
@@ -14640,7 +15653,7 @@
               <a:buNone/>
             </a:pPr>
             <a:r>
-              <a:rPr lang="ru" sz="1400">
+              <a:rPr lang="ru" sz="1400" dirty="0">
                 <a:solidFill>
                   <a:srgbClr val="000000"/>
                 </a:solidFill>
@@ -14649,7 +15662,19 @@
                 <a:cs typeface="Arial"/>
                 <a:sym typeface="Arial"/>
               </a:rPr>
-              <a:t>1) Выполнять загрузку реестров договоров в базу данных</a:t>
+              <a:t>1) Выполнять загрузку реестров договоров в базу </a:t>
+            </a:r>
+            <a:r>
+              <a:rPr lang="ru" sz="1400" dirty="0" smtClean="0">
+                <a:solidFill>
+                  <a:srgbClr val="000000"/>
+                </a:solidFill>
+                <a:latin typeface="Arial"/>
+                <a:ea typeface="Arial"/>
+                <a:cs typeface="Arial"/>
+                <a:sym typeface="Arial"/>
+              </a:rPr>
+              <a:t>данных.</a:t>
             </a:r>
             <a:endParaRPr sz="1400">
               <a:solidFill>
@@ -14672,7 +15697,7 @@
               <a:buNone/>
             </a:pPr>
             <a:r>
-              <a:rPr lang="ru" sz="1400">
+              <a:rPr lang="ru" sz="1400" dirty="0">
                 <a:solidFill>
                   <a:srgbClr val="000000"/>
                 </a:solidFill>
@@ -14681,7 +15706,19 @@
                 <a:cs typeface="Arial"/>
                 <a:sym typeface="Arial"/>
               </a:rPr>
-              <a:t>2) Редактировать реестры</a:t>
+              <a:t>2) Редактировать </a:t>
+            </a:r>
+            <a:r>
+              <a:rPr lang="ru" sz="1400" dirty="0" smtClean="0">
+                <a:solidFill>
+                  <a:srgbClr val="000000"/>
+                </a:solidFill>
+                <a:latin typeface="Arial"/>
+                <a:ea typeface="Arial"/>
+                <a:cs typeface="Arial"/>
+                <a:sym typeface="Arial"/>
+              </a:rPr>
+              <a:t>реестры.</a:t>
             </a:r>
             <a:endParaRPr sz="1400">
               <a:solidFill>
@@ -14704,7 +15741,7 @@
               <a:buNone/>
             </a:pPr>
             <a:r>
-              <a:rPr lang="ru" sz="1400">
+              <a:rPr lang="ru" sz="1400" dirty="0">
                 <a:solidFill>
                   <a:srgbClr val="000000"/>
                 </a:solidFill>
@@ -14713,7 +15750,19 @@
                 <a:cs typeface="Arial"/>
                 <a:sym typeface="Arial"/>
               </a:rPr>
-              <a:t>3) Редактировать содержимое реестров</a:t>
+              <a:t>3) Редактировать содержимое </a:t>
+            </a:r>
+            <a:r>
+              <a:rPr lang="ru" sz="1400" dirty="0" smtClean="0">
+                <a:solidFill>
+                  <a:srgbClr val="000000"/>
+                </a:solidFill>
+                <a:latin typeface="Arial"/>
+                <a:ea typeface="Arial"/>
+                <a:cs typeface="Arial"/>
+                <a:sym typeface="Arial"/>
+              </a:rPr>
+              <a:t>реестров.</a:t>
             </a:r>
             <a:endParaRPr sz="1400">
               <a:solidFill>
@@ -14736,7 +15785,7 @@
               <a:buNone/>
             </a:pPr>
             <a:r>
-              <a:rPr lang="ru" sz="1400">
+              <a:rPr lang="ru" sz="1400" dirty="0">
                 <a:solidFill>
                   <a:srgbClr val="000000"/>
                 </a:solidFill>
@@ -14746,6 +15795,18 @@
                 <a:sym typeface="Arial"/>
               </a:rPr>
               <a:t>4) Обрабатывать содержимое реестров и реестры целиком </a:t>
+            </a:r>
+            <a:r>
+              <a:rPr lang="ru" sz="1400" dirty="0" smtClean="0">
+                <a:solidFill>
+                  <a:srgbClr val="000000"/>
+                </a:solidFill>
+                <a:latin typeface="Arial"/>
+                <a:ea typeface="Arial"/>
+                <a:cs typeface="Arial"/>
+                <a:sym typeface="Arial"/>
+              </a:rPr>
+              <a:t>.</a:t>
             </a:r>
             <a:endParaRPr sz="1400">
               <a:solidFill>
@@ -14768,7 +15829,7 @@
               <a:buNone/>
             </a:pPr>
             <a:r>
-              <a:rPr lang="ru" sz="1400">
+              <a:rPr lang="ru" sz="1400" dirty="0">
                 <a:solidFill>
                   <a:srgbClr val="000000"/>
                 </a:solidFill>
@@ -14777,7 +15838,19 @@
                 <a:cs typeface="Arial"/>
                 <a:sym typeface="Arial"/>
               </a:rPr>
-              <a:t>5) Удалять загруженные ранее реестры и отдельные неактивные договора</a:t>
+              <a:t>5) Удалять загруженные ранее реестры и отдельные неактивные </a:t>
+            </a:r>
+            <a:r>
+              <a:rPr lang="ru" sz="1400" dirty="0" smtClean="0">
+                <a:solidFill>
+                  <a:srgbClr val="000000"/>
+                </a:solidFill>
+                <a:latin typeface="Arial"/>
+                <a:ea typeface="Arial"/>
+                <a:cs typeface="Arial"/>
+                <a:sym typeface="Arial"/>
+              </a:rPr>
+              <a:t>договора.</a:t>
             </a:r>
             <a:endParaRPr sz="1400">
               <a:solidFill>
@@ -14870,18 +15943,6 @@
               <a:defRPr/>
             </a:pPr>
             <a:r>
-              <a:rPr lang="ru-RU" dirty="0" smtClean="0">
-                <a:solidFill>
-                  <a:schemeClr val="accent1"/>
-                </a:solidFill>
-                <a:latin typeface="Lato"/>
-                <a:ea typeface="Lato"/>
-                <a:cs typeface="Lato"/>
-                <a:sym typeface="Lato"/>
-              </a:rPr>
-              <a:t>8</a:t>
-            </a:r>
-            <a:r>
               <a:rPr kumimoji="0" lang="ru-RU" sz="1400" b="0" i="0" u="none" strike="noStrike" kern="0" cap="none" spc="0" normalizeH="0" noProof="0" dirty="0" smtClean="0">
                 <a:ln>
                   <a:noFill/>
@@ -14897,7 +15958,25 @@
                 <a:cs typeface="Lato"/>
                 <a:sym typeface="Lato"/>
               </a:rPr>
-              <a:t>/20</a:t>
+              <a:t>9</a:t>
+            </a:r>
+            <a:r>
+              <a:rPr kumimoji="0" lang="ru-RU" sz="1400" b="0" i="0" u="none" strike="noStrike" kern="0" cap="none" spc="0" normalizeH="0" noProof="0" dirty="0" smtClean="0">
+                <a:ln>
+                  <a:noFill/>
+                </a:ln>
+                <a:solidFill>
+                  <a:schemeClr val="accent1"/>
+                </a:solidFill>
+                <a:effectLst/>
+                <a:uLnTx/>
+                <a:uFillTx/>
+                <a:latin typeface="Lato"/>
+                <a:ea typeface="Lato"/>
+                <a:cs typeface="Lato"/>
+                <a:sym typeface="Lato"/>
+              </a:rPr>
+              <a:t>/23</a:t>
             </a:r>
             <a:endParaRPr kumimoji="0" lang="ru-RU" sz="1400" b="0" i="0" u="none" strike="noStrike" kern="0" cap="none" spc="0" normalizeH="0" baseline="0" noProof="0" dirty="0">
               <a:ln>
@@ -14922,6 +16001,13 @@
   <p:clrMapOvr>
     <a:masterClrMapping/>
   </p:clrMapOvr>
+  <p:timing>
+    <p:tnLst>
+      <p:par>
+        <p:cTn id="1" dur="indefinite" restart="never" nodeType="tmRoot"/>
+      </p:par>
+    </p:tnLst>
+  </p:timing>
 </p:sld>
 </file>
 

</xml_diff>